<commit_message>
updated debug tutorial slides
</commit_message>
<xml_diff>
--- a/slides/3-jupytercon_2020_debug_tutorial.pptx
+++ b/slides/3-jupytercon_2020_debug_tutorial.pptx
@@ -5,15 +5,16 @@
     <p:sldMasterId id="2147483648" r:id="rId1"/>
   </p:sldMasterIdLst>
   <p:notesMasterIdLst>
-    <p:notesMasterId r:id="rId8"/>
+    <p:notesMasterId r:id="rId9"/>
   </p:notesMasterIdLst>
   <p:sldIdLst>
     <p:sldId id="257" r:id="rId2"/>
     <p:sldId id="258" r:id="rId3"/>
     <p:sldId id="260" r:id="rId4"/>
-    <p:sldId id="259" r:id="rId5"/>
+    <p:sldId id="263" r:id="rId5"/>
     <p:sldId id="261" r:id="rId6"/>
     <p:sldId id="262" r:id="rId7"/>
+    <p:sldId id="259" r:id="rId8"/>
   </p:sldIdLst>
   <p:sldSz cx="12192000" cy="6858000"/>
   <p:notesSz cx="6858000" cy="9144000"/>
@@ -925,7 +926,7 @@
     </p:spTree>
     <p:extLst>
       <p:ext uri="{BB962C8B-B14F-4D97-AF65-F5344CB8AC3E}">
-        <p14:creationId xmlns:p14="http://schemas.microsoft.com/office/powerpoint/2010/main" val="373927723"/>
+        <p14:creationId xmlns:p14="http://schemas.microsoft.com/office/powerpoint/2010/main" val="319039611"/>
       </p:ext>
     </p:extLst>
   </p:cSld>
@@ -1236,6 +1237,161 @@
     <p:extLst>
       <p:ext uri="{BB962C8B-B14F-4D97-AF65-F5344CB8AC3E}">
         <p14:creationId xmlns:p14="http://schemas.microsoft.com/office/powerpoint/2010/main" val="999005880"/>
+      </p:ext>
+    </p:extLst>
+  </p:cSld>
+  <p:clrMapOvr>
+    <a:masterClrMapping/>
+  </p:clrMapOvr>
+</p:notes>
+</file>
+
+<file path=ppt/notesSlides/notesSlide6.xml><?xml version="1.0" encoding="utf-8"?>
+<p:notes xmlns:a="http://schemas.openxmlformats.org/drawingml/2006/main" xmlns:r="http://schemas.openxmlformats.org/officeDocument/2006/relationships" xmlns:p="http://schemas.openxmlformats.org/presentationml/2006/main">
+  <p:cSld>
+    <p:spTree>
+      <p:nvGrpSpPr>
+        <p:cNvPr id="1" name=""/>
+        <p:cNvGrpSpPr/>
+        <p:nvPr/>
+      </p:nvGrpSpPr>
+      <p:grpSpPr>
+        <a:xfrm>
+          <a:off x="0" y="0"/>
+          <a:ext cx="0" cy="0"/>
+          <a:chOff x="0" y="0"/>
+          <a:chExt cx="0" cy="0"/>
+        </a:xfrm>
+      </p:grpSpPr>
+      <p:sp>
+        <p:nvSpPr>
+          <p:cNvPr id="2" name="Slide Image Placeholder 1"/>
+          <p:cNvSpPr>
+            <a:spLocks noGrp="1" noRot="1" noChangeAspect="1"/>
+          </p:cNvSpPr>
+          <p:nvPr>
+            <p:ph type="sldImg"/>
+          </p:nvPr>
+        </p:nvSpPr>
+        <p:spPr/>
+      </p:sp>
+      <p:sp>
+        <p:nvSpPr>
+          <p:cNvPr id="3" name="Notes Placeholder 2"/>
+          <p:cNvSpPr>
+            <a:spLocks noGrp="1"/>
+          </p:cNvSpPr>
+          <p:nvPr>
+            <p:ph type="body" idx="1"/>
+          </p:nvPr>
+        </p:nvSpPr>
+        <p:spPr/>
+        <p:txBody>
+          <a:bodyPr/>
+          <a:lstStyle/>
+          <a:p>
+            <a:r>
+              <a:rPr lang="en-US" dirty="0"/>
+              <a:t>Run notebook command: </a:t>
+            </a:r>
+            <a:r>
+              <a:rPr lang="en-US" dirty="0" err="1"/>
+              <a:t>jupyter</a:t>
+            </a:r>
+            <a:r>
+              <a:rPr lang="en-US" dirty="0"/>
+              <a:t> notebook</a:t>
+            </a:r>
+          </a:p>
+        </p:txBody>
+      </p:sp>
+      <p:sp>
+        <p:nvSpPr>
+          <p:cNvPr id="4" name="Slide Number Placeholder 3"/>
+          <p:cNvSpPr>
+            <a:spLocks noGrp="1"/>
+          </p:cNvSpPr>
+          <p:nvPr>
+            <p:ph type="sldNum" sz="quarter" idx="5"/>
+          </p:nvPr>
+        </p:nvSpPr>
+        <p:spPr/>
+        <p:txBody>
+          <a:bodyPr/>
+          <a:lstStyle/>
+          <a:p>
+            <a:pPr marL="0" marR="0" lvl="0" indent="0" algn="r" defTabSz="914400" rtl="0" eaLnBrk="1" fontAlgn="auto" latinLnBrk="0" hangingPunct="1">
+              <a:lnSpc>
+                <a:spcPct val="100000"/>
+              </a:lnSpc>
+              <a:spcBef>
+                <a:spcPts val="0"/>
+              </a:spcBef>
+              <a:spcAft>
+                <a:spcPts val="0"/>
+              </a:spcAft>
+              <a:buClrTx/>
+              <a:buSzTx/>
+              <a:buFontTx/>
+              <a:buNone/>
+              <a:tabLst/>
+              <a:defRPr/>
+            </a:pPr>
+            <a:fld id="{E751F81F-F737-384C-90EC-D4EDDECE9DC1}" type="slidenum">
+              <a:rPr kumimoji="0" lang="en-US" sz="1200" b="0" i="0" u="none" strike="noStrike" kern="1200" cap="none" spc="0" normalizeH="0" baseline="0" noProof="0" smtClean="0">
+                <a:ln>
+                  <a:noFill/>
+                </a:ln>
+                <a:solidFill>
+                  <a:prstClr val="black"/>
+                </a:solidFill>
+                <a:effectLst/>
+                <a:uLnTx/>
+                <a:uFillTx/>
+                <a:latin typeface="Calibri" panose="020F0502020204030204"/>
+                <a:ea typeface="+mn-ea"/>
+                <a:cs typeface="+mn-cs"/>
+              </a:rPr>
+              <a:pPr marL="0" marR="0" lvl="0" indent="0" algn="r" defTabSz="914400" rtl="0" eaLnBrk="1" fontAlgn="auto" latinLnBrk="0" hangingPunct="1">
+                <a:lnSpc>
+                  <a:spcPct val="100000"/>
+                </a:lnSpc>
+                <a:spcBef>
+                  <a:spcPts val="0"/>
+                </a:spcBef>
+                <a:spcAft>
+                  <a:spcPts val="0"/>
+                </a:spcAft>
+                <a:buClrTx/>
+                <a:buSzTx/>
+                <a:buFontTx/>
+                <a:buNone/>
+                <a:tabLst/>
+                <a:defRPr/>
+              </a:pPr>
+              <a:t>7</a:t>
+            </a:fld>
+            <a:endParaRPr kumimoji="0" lang="en-US" sz="1200" b="0" i="0" u="none" strike="noStrike" kern="1200" cap="none" spc="0" normalizeH="0" baseline="0" noProof="0">
+              <a:ln>
+                <a:noFill/>
+              </a:ln>
+              <a:solidFill>
+                <a:prstClr val="black"/>
+              </a:solidFill>
+              <a:effectLst/>
+              <a:uLnTx/>
+              <a:uFillTx/>
+              <a:latin typeface="Calibri" panose="020F0502020204030204"/>
+              <a:ea typeface="+mn-ea"/>
+              <a:cs typeface="+mn-cs"/>
+            </a:endParaRPr>
+          </a:p>
+        </p:txBody>
+      </p:sp>
+    </p:spTree>
+    <p:extLst>
+      <p:ext uri="{BB962C8B-B14F-4D97-AF65-F5344CB8AC3E}">
+        <p14:creationId xmlns:p14="http://schemas.microsoft.com/office/powerpoint/2010/main" val="373927723"/>
       </p:ext>
     </p:extLst>
   </p:cSld>
@@ -4186,7 +4342,7 @@
         </p:nvSpPr>
         <p:spPr>
           <a:xfrm>
-            <a:off x="6673928" y="1198179"/>
+            <a:off x="6657316" y="605077"/>
             <a:ext cx="5016926" cy="2889114"/>
           </a:xfrm>
         </p:spPr>
@@ -4605,6 +4761,382 @@
           </a:prstGeom>
         </p:spPr>
       </p:pic>
+      <p:grpSp>
+        <p:nvGrpSpPr>
+          <p:cNvPr id="7" name="Group 6">
+            <a:extLst>
+              <a:ext uri="{FF2B5EF4-FFF2-40B4-BE49-F238E27FC236}">
+                <a16:creationId xmlns:a16="http://schemas.microsoft.com/office/drawing/2014/main" xmlns="" id="{A52C89C1-651B-4C44-8C4C-6848DF78EA34}"/>
+              </a:ext>
+            </a:extLst>
+          </p:cNvPr>
+          <p:cNvGrpSpPr/>
+          <p:nvPr/>
+        </p:nvGrpSpPr>
+        <p:grpSpPr>
+          <a:xfrm>
+            <a:off x="7433872" y="5864129"/>
+            <a:ext cx="2556962" cy="954107"/>
+            <a:chOff x="1967314" y="3306766"/>
+            <a:chExt cx="2556962" cy="1064608"/>
+          </a:xfrm>
+        </p:grpSpPr>
+        <p:grpSp>
+          <p:nvGrpSpPr>
+            <p:cNvPr id="8" name="Group 7">
+              <a:extLst>
+                <a:ext uri="{FF2B5EF4-FFF2-40B4-BE49-F238E27FC236}">
+                  <a16:creationId xmlns:a16="http://schemas.microsoft.com/office/drawing/2014/main" xmlns="" id="{FA18B175-3BC8-B74F-BBBC-A78CC0A3361B}"/>
+                </a:ext>
+              </a:extLst>
+            </p:cNvPr>
+            <p:cNvGrpSpPr/>
+            <p:nvPr/>
+          </p:nvGrpSpPr>
+          <p:grpSpPr>
+            <a:xfrm>
+              <a:off x="1967314" y="3395762"/>
+              <a:ext cx="270993" cy="670306"/>
+              <a:chOff x="4700197" y="3560346"/>
+              <a:chExt cx="270993" cy="670306"/>
+            </a:xfrm>
+          </p:grpSpPr>
+          <p:pic>
+            <p:nvPicPr>
+              <p:cNvPr id="11" name="Picture 34" descr="Github Icon Png #419235 - Free Icons Library">
+                <a:extLst>
+                  <a:ext uri="{FF2B5EF4-FFF2-40B4-BE49-F238E27FC236}">
+                    <a16:creationId xmlns:a16="http://schemas.microsoft.com/office/drawing/2014/main" xmlns="" id="{A4978DE2-58AC-EB46-914C-ECA70B849D57}"/>
+                  </a:ext>
+                </a:extLst>
+              </p:cNvPr>
+              <p:cNvPicPr>
+                <a:picLocks noChangeAspect="1" noChangeArrowheads="1"/>
+              </p:cNvPicPr>
+              <p:nvPr/>
+            </p:nvPicPr>
+            <p:blipFill>
+              <a:blip r:embed="rId3">
+                <a:extLst>
+                  <a:ext uri="{28A0092B-C50C-407E-A947-70E740481C1C}">
+                    <a14:useLocalDpi xmlns:a14="http://schemas.microsoft.com/office/drawing/2010/main" val="0"/>
+                  </a:ext>
+                </a:extLst>
+              </a:blip>
+              <a:srcRect/>
+              <a:stretch>
+                <a:fillRect/>
+              </a:stretch>
+            </p:blipFill>
+            <p:spPr bwMode="auto">
+              <a:xfrm>
+                <a:off x="4700337" y="3982985"/>
+                <a:ext cx="247668" cy="247667"/>
+              </a:xfrm>
+              <a:prstGeom prst="rect">
+                <a:avLst/>
+              </a:prstGeom>
+              <a:noFill/>
+              <a:extLst>
+                <a:ext uri="{909E8E84-426E-40DD-AFC4-6F175D3DCCD1}">
+                  <a14:hiddenFill xmlns:a14="http://schemas.microsoft.com/office/drawing/2010/main">
+                    <a:solidFill>
+                      <a:srgbClr val="FFFFFF"/>
+                    </a:solidFill>
+                  </a14:hiddenFill>
+                </a:ext>
+              </a:extLst>
+            </p:spPr>
+          </p:pic>
+          <p:pic>
+            <p:nvPicPr>
+              <p:cNvPr id="12" name="Picture 11" descr="Email Icon White Png #120721 - Free Icons Library">
+                <a:extLst>
+                  <a:ext uri="{FF2B5EF4-FFF2-40B4-BE49-F238E27FC236}">
+                    <a16:creationId xmlns:a16="http://schemas.microsoft.com/office/drawing/2014/main" xmlns="" id="{CF85B15E-8701-4F49-A874-87B380E254B3}"/>
+                  </a:ext>
+                </a:extLst>
+              </p:cNvPr>
+              <p:cNvPicPr>
+                <a:picLocks noChangeAspect="1" noChangeArrowheads="1"/>
+              </p:cNvPicPr>
+              <p:nvPr/>
+            </p:nvPicPr>
+            <p:blipFill>
+              <a:blip r:embed="rId4">
+                <a:extLst>
+                  <a:ext uri="{28A0092B-C50C-407E-A947-70E740481C1C}">
+                    <a14:useLocalDpi xmlns:a14="http://schemas.microsoft.com/office/drawing/2010/main" val="0"/>
+                  </a:ext>
+                </a:extLst>
+              </a:blip>
+              <a:srcRect/>
+              <a:stretch>
+                <a:fillRect/>
+              </a:stretch>
+            </p:blipFill>
+            <p:spPr bwMode="auto">
+              <a:xfrm>
+                <a:off x="4700197" y="3560346"/>
+                <a:ext cx="270993" cy="205109"/>
+              </a:xfrm>
+              <a:prstGeom prst="rect">
+                <a:avLst/>
+              </a:prstGeom>
+              <a:noFill/>
+              <a:extLst>
+                <a:ext uri="{909E8E84-426E-40DD-AFC4-6F175D3DCCD1}">
+                  <a14:hiddenFill xmlns:a14="http://schemas.microsoft.com/office/drawing/2010/main">
+                    <a:solidFill>
+                      <a:srgbClr val="FFFFFF"/>
+                    </a:solidFill>
+                  </a14:hiddenFill>
+                </a:ext>
+              </a:extLst>
+            </p:spPr>
+          </p:pic>
+        </p:grpSp>
+        <p:sp>
+          <p:nvSpPr>
+            <p:cNvPr id="9" name="Rectangle 8">
+              <a:extLst>
+                <a:ext uri="{FF2B5EF4-FFF2-40B4-BE49-F238E27FC236}">
+                  <a16:creationId xmlns:a16="http://schemas.microsoft.com/office/drawing/2014/main" xmlns="" id="{F394083A-CF04-6040-8C9C-646225CC7F6A}"/>
+                </a:ext>
+              </a:extLst>
+            </p:cNvPr>
+            <p:cNvSpPr/>
+            <p:nvPr/>
+          </p:nvSpPr>
+          <p:spPr>
+            <a:xfrm>
+              <a:off x="2366571" y="3306766"/>
+              <a:ext cx="2157705" cy="1064608"/>
+            </a:xfrm>
+            <a:prstGeom prst="rect">
+              <a:avLst/>
+            </a:prstGeom>
+          </p:spPr>
+          <p:txBody>
+            <a:bodyPr wrap="square">
+              <a:spAutoFit/>
+            </a:bodyPr>
+            <a:lstStyle/>
+            <a:p>
+              <a:r>
+                <a:rPr lang="en-CA" sz="1400" dirty="0">
+                  <a:hlinkClick r:id="rId5"/>
+                </a:rPr>
+                <a:t>telamonian@hotmail.com</a:t>
+              </a:r>
+              <a:endParaRPr lang="en-US" sz="1400" dirty="0">
+                <a:solidFill>
+                  <a:schemeClr val="bg1"/>
+                </a:solidFill>
+              </a:endParaRPr>
+            </a:p>
+            <a:p>
+              <a:endParaRPr lang="en-CA" sz="1400" u="sng" dirty="0">
+                <a:solidFill>
+                  <a:srgbClr val="FFD6A9"/>
+                </a:solidFill>
+                <a:hlinkClick r:id="rId6">
+                  <a:extLst>
+                    <a:ext uri="{A12FA001-AC4F-418D-AE19-62706E023703}">
+                      <ahyp:hlinkClr xmlns:ahyp="http://schemas.microsoft.com/office/drawing/2018/hyperlinkcolor" xmlns="" val="tx"/>
+                    </a:ext>
+                  </a:extLst>
+                </a:hlinkClick>
+              </a:endParaRPr>
+            </a:p>
+            <a:p>
+              <a:r>
+                <a:rPr lang="en-CA" sz="1400" u="sng" dirty="0">
+                  <a:solidFill>
+                    <a:srgbClr val="FFD6A9"/>
+                  </a:solidFill>
+                  <a:hlinkClick r:id="rId6">
+                    <a:extLst>
+                      <a:ext uri="{A12FA001-AC4F-418D-AE19-62706E023703}">
+                        <ahyp:hlinkClr xmlns:ahyp="http://schemas.microsoft.com/office/drawing/2018/hyperlinkcolor" xmlns="" val="tx"/>
+                      </a:ext>
+                    </a:extLst>
+                  </a:hlinkClick>
+                </a:rPr>
+                <a:t>github.com/</a:t>
+              </a:r>
+              <a:r>
+                <a:rPr lang="en-CA" sz="1400" u="sng" dirty="0" err="1">
+                  <a:solidFill>
+                    <a:srgbClr val="FFD6A9"/>
+                  </a:solidFill>
+                </a:rPr>
+                <a:t>telamonian</a:t>
+              </a:r>
+              <a:endParaRPr lang="en-CA" sz="1400" u="sng" dirty="0">
+                <a:solidFill>
+                  <a:srgbClr val="FFD6A9"/>
+                </a:solidFill>
+              </a:endParaRPr>
+            </a:p>
+            <a:p>
+              <a:endParaRPr lang="en-CA" sz="1400" dirty="0">
+                <a:solidFill>
+                  <a:schemeClr val="bg1"/>
+                </a:solidFill>
+              </a:endParaRPr>
+            </a:p>
+          </p:txBody>
+        </p:sp>
+      </p:grpSp>
+      <p:grpSp>
+        <p:nvGrpSpPr>
+          <p:cNvPr id="16" name="Group 15">
+            <a:extLst>
+              <a:ext uri="{FF2B5EF4-FFF2-40B4-BE49-F238E27FC236}">
+                <a16:creationId xmlns:a16="http://schemas.microsoft.com/office/drawing/2014/main" xmlns="" id="{6E975FA8-6CB3-6046-8483-8063E83C9094}"/>
+              </a:ext>
+            </a:extLst>
+          </p:cNvPr>
+          <p:cNvGrpSpPr/>
+          <p:nvPr/>
+        </p:nvGrpSpPr>
+        <p:grpSpPr>
+          <a:xfrm>
+            <a:off x="7332619" y="3922008"/>
+            <a:ext cx="2885090" cy="1857239"/>
+            <a:chOff x="5397450" y="3597095"/>
+            <a:chExt cx="2885090" cy="1857239"/>
+          </a:xfrm>
+        </p:grpSpPr>
+        <p:sp>
+          <p:nvSpPr>
+            <p:cNvPr id="17" name="Title 1">
+              <a:extLst>
+                <a:ext uri="{FF2B5EF4-FFF2-40B4-BE49-F238E27FC236}">
+                  <a16:creationId xmlns:a16="http://schemas.microsoft.com/office/drawing/2014/main" xmlns="" id="{EC339BDF-8D57-554A-997A-6240AB811DDB}"/>
+                </a:ext>
+              </a:extLst>
+            </p:cNvPr>
+            <p:cNvSpPr txBox="1">
+              <a:spLocks/>
+            </p:cNvSpPr>
+            <p:nvPr/>
+          </p:nvSpPr>
+          <p:spPr>
+            <a:xfrm>
+              <a:off x="5397450" y="4699012"/>
+              <a:ext cx="2885090" cy="755322"/>
+            </a:xfrm>
+            <a:prstGeom prst="rect">
+              <a:avLst/>
+            </a:prstGeom>
+          </p:spPr>
+          <p:txBody>
+            <a:bodyPr vert="horz" lIns="217451" tIns="108725" rIns="217451" bIns="108725" rtlCol="0" anchor="t">
+              <a:noAutofit/>
+            </a:bodyPr>
+            <a:lstStyle>
+              <a:lvl1pPr algn="l" defTabSz="1088256" rtl="0" eaLnBrk="1" latinLnBrk="0" hangingPunct="1">
+                <a:spcBef>
+                  <a:spcPct val="0"/>
+                </a:spcBef>
+                <a:buNone/>
+                <a:defRPr lang="en-US" sz="8300" b="0" i="0" kern="1200" cap="none" dirty="0">
+                  <a:solidFill>
+                    <a:srgbClr val="003247"/>
+                  </a:solidFill>
+                  <a:latin typeface="HelvNeue for IBM Light"/>
+                  <a:ea typeface="+mj-ea"/>
+                  <a:cs typeface="HelvNeue for IBM Light"/>
+                </a:defRPr>
+              </a:lvl1pPr>
+            </a:lstStyle>
+            <a:p>
+              <a:pPr algn="ctr"/>
+              <a:r>
+                <a:rPr lang="en-US" sz="1600" dirty="0">
+                  <a:solidFill>
+                    <a:schemeClr val="bg1"/>
+                  </a:solidFill>
+                  <a:latin typeface="+mn-lt"/>
+                </a:rPr>
+                <a:t>Max Klein</a:t>
+              </a:r>
+            </a:p>
+            <a:p>
+              <a:pPr algn="ctr"/>
+              <a:r>
+                <a:rPr lang="en-US" sz="1600" dirty="0">
+                  <a:solidFill>
+                    <a:schemeClr val="bg1"/>
+                  </a:solidFill>
+                  <a:latin typeface="+mn-lt"/>
+                </a:rPr>
+                <a:t>Software Developer</a:t>
+              </a:r>
+            </a:p>
+            <a:p>
+              <a:pPr algn="ctr"/>
+              <a:r>
+                <a:rPr lang="en-US" sz="1600" dirty="0">
+                  <a:solidFill>
+                    <a:schemeClr val="bg1"/>
+                  </a:solidFill>
+                  <a:latin typeface="+mn-lt"/>
+                </a:rPr>
+                <a:t>JP Morgan</a:t>
+              </a:r>
+            </a:p>
+          </p:txBody>
+        </p:sp>
+        <p:pic>
+          <p:nvPicPr>
+            <p:cNvPr id="18" name="Picture 2">
+              <a:extLst>
+                <a:ext uri="{FF2B5EF4-FFF2-40B4-BE49-F238E27FC236}">
+                  <a16:creationId xmlns:a16="http://schemas.microsoft.com/office/drawing/2014/main" xmlns="" id="{12A526C2-86DA-1042-9A7A-D2A1E1DD6832}"/>
+                </a:ext>
+              </a:extLst>
+            </p:cNvPr>
+            <p:cNvPicPr>
+              <a:picLocks noChangeAspect="1" noChangeArrowheads="1"/>
+            </p:cNvPicPr>
+            <p:nvPr/>
+          </p:nvPicPr>
+          <p:blipFill>
+            <a:blip r:embed="rId7">
+              <a:extLst>
+                <a:ext uri="{28A0092B-C50C-407E-A947-70E740481C1C}">
+                  <a14:useLocalDpi xmlns:a14="http://schemas.microsoft.com/office/drawing/2010/main" val="0"/>
+                </a:ext>
+              </a:extLst>
+            </a:blip>
+            <a:stretch>
+              <a:fillRect/>
+            </a:stretch>
+          </p:blipFill>
+          <p:spPr bwMode="auto">
+            <a:xfrm>
+              <a:off x="6336796" y="3597095"/>
+              <a:ext cx="1107945" cy="1107945"/>
+            </a:xfrm>
+            <a:prstGeom prst="rect">
+              <a:avLst/>
+            </a:prstGeom>
+            <a:noFill/>
+            <a:extLst>
+              <a:ext uri="{909E8E84-426E-40DD-AFC4-6F175D3DCCD1}">
+                <a14:hiddenFill xmlns:a14="http://schemas.microsoft.com/office/drawing/2010/main">
+                  <a:solidFill>
+                    <a:srgbClr val="FFFFFF"/>
+                  </a:solidFill>
+                </a14:hiddenFill>
+              </a:ext>
+            </a:extLst>
+          </p:spPr>
+        </p:pic>
+      </p:grpSp>
     </p:spTree>
     <p:extLst>
       <p:ext uri="{BB962C8B-B14F-4D97-AF65-F5344CB8AC3E}">
@@ -6576,10 +7108,182 @@
               </a:rPr>
               <a:t> as necessary</a:t>
             </a:r>
-            <a:endParaRPr lang="en-CA" sz="1600" dirty="0">
+          </a:p>
+          <a:p>
+            <a:pPr marL="800100" lvl="1" indent="-342900" algn="l">
+              <a:buClr>
+                <a:schemeClr val="bg1"/>
+              </a:buClr>
+              <a:buFont typeface="Arial" panose="020B0604020202020204" pitchFamily="34" charset="0"/>
+              <a:buChar char="•"/>
+            </a:pPr>
+            <a:r>
+              <a:rPr lang="en-CA" sz="1200" dirty="0" smtClean="0">
+                <a:solidFill>
+                  <a:schemeClr val="bg1"/>
+                </a:solidFill>
+                <a:ea typeface="Consolas" charset="0"/>
+                <a:cs typeface="Consolas" charset="0"/>
+              </a:rPr>
+              <a:t>For the “</a:t>
+            </a:r>
+            <a:r>
+              <a:rPr lang="en-CA" sz="1200" dirty="0" err="1" smtClean="0">
+                <a:solidFill>
+                  <a:schemeClr val="bg1"/>
+                </a:solidFill>
+                <a:ea typeface="Consolas" charset="0"/>
+                <a:cs typeface="Consolas" charset="0"/>
+              </a:rPr>
+              <a:t>mybutton</a:t>
+            </a:r>
+            <a:r>
+              <a:rPr lang="en-CA" sz="1200" dirty="0" smtClean="0">
+                <a:solidFill>
+                  <a:schemeClr val="bg1"/>
+                </a:solidFill>
+                <a:ea typeface="Consolas" charset="0"/>
+                <a:cs typeface="Consolas" charset="0"/>
+              </a:rPr>
+              <a:t>” example project, c</a:t>
+            </a:r>
+            <a:r>
+              <a:rPr lang="en-CA" sz="1200" dirty="0" smtClean="0">
+                <a:solidFill>
+                  <a:schemeClr val="bg1"/>
+                </a:solidFill>
+                <a:ea typeface="Consolas" charset="0"/>
+                <a:cs typeface="Consolas" charset="0"/>
+              </a:rPr>
+              <a:t>hange “</a:t>
+            </a:r>
+            <a:r>
+              <a:rPr lang="en-CA" sz="1200" dirty="0" err="1" smtClean="0">
+                <a:solidFill>
+                  <a:schemeClr val="bg1"/>
+                </a:solidFill>
+                <a:ea typeface="Consolas" charset="0"/>
+                <a:cs typeface="Consolas" charset="0"/>
+              </a:rPr>
+              <a:t>webroot</a:t>
+            </a:r>
+            <a:r>
+              <a:rPr lang="en-CA" sz="1200" dirty="0" smtClean="0">
+                <a:solidFill>
+                  <a:schemeClr val="bg1"/>
+                </a:solidFill>
+                <a:ea typeface="Consolas" charset="0"/>
+                <a:cs typeface="Consolas" charset="0"/>
+              </a:rPr>
+              <a:t>” to:</a:t>
+            </a:r>
+            <a:br>
+              <a:rPr lang="en-CA" sz="1200" dirty="0" smtClean="0">
+                <a:solidFill>
+                  <a:schemeClr val="bg1"/>
+                </a:solidFill>
+                <a:ea typeface="Consolas" charset="0"/>
+                <a:cs typeface="Consolas" charset="0"/>
+              </a:rPr>
+            </a:br>
+            <a:r>
+              <a:rPr lang="en-CA" sz="1200" dirty="0">
+                <a:solidFill>
+                  <a:schemeClr val="bg1"/>
+                </a:solidFill>
+                <a:ea typeface="Consolas" charset="0"/>
+                <a:cs typeface="Consolas" charset="0"/>
+              </a:rPr>
+              <a:t/>
+            </a:r>
+            <a:br>
+              <a:rPr lang="en-CA" sz="1200" dirty="0">
+                <a:solidFill>
+                  <a:schemeClr val="bg1"/>
+                </a:solidFill>
+                <a:ea typeface="Consolas" charset="0"/>
+                <a:cs typeface="Consolas" charset="0"/>
+              </a:rPr>
+            </a:br>
+            <a:r>
+              <a:rPr lang="en-CA" sz="1200" dirty="0">
+                <a:latin typeface="Consolas" charset="0"/>
+                <a:ea typeface="Consolas" charset="0"/>
+                <a:cs typeface="Consolas" charset="0"/>
+              </a:rPr>
+              <a:t> </a:t>
+            </a:r>
+            <a:r>
+              <a:rPr lang="en-CA" sz="1200" dirty="0">
+                <a:solidFill>
+                  <a:schemeClr val="bg1"/>
+                </a:solidFill>
+                <a:latin typeface="Consolas" charset="0"/>
+                <a:ea typeface="Consolas" charset="0"/>
+                <a:cs typeface="Consolas" charset="0"/>
+              </a:rPr>
+              <a:t>"</a:t>
+            </a:r>
+            <a:r>
+              <a:rPr lang="en-CA" sz="1200" dirty="0" err="1">
+                <a:solidFill>
+                  <a:schemeClr val="bg1"/>
+                </a:solidFill>
+                <a:latin typeface="Consolas" charset="0"/>
+                <a:ea typeface="Consolas" charset="0"/>
+                <a:cs typeface="Consolas" charset="0"/>
+              </a:rPr>
+              <a:t>webRoot</a:t>
+            </a:r>
+            <a:r>
+              <a:rPr lang="en-CA" sz="1200" dirty="0">
+                <a:solidFill>
+                  <a:schemeClr val="bg1"/>
+                </a:solidFill>
+                <a:latin typeface="Consolas" charset="0"/>
+                <a:ea typeface="Consolas" charset="0"/>
+                <a:cs typeface="Consolas" charset="0"/>
+              </a:rPr>
+              <a:t>": "${</a:t>
+            </a:r>
+            <a:r>
+              <a:rPr lang="en-CA" sz="1200" dirty="0" err="1">
+                <a:solidFill>
+                  <a:schemeClr val="bg1"/>
+                </a:solidFill>
+                <a:latin typeface="Consolas" charset="0"/>
+                <a:ea typeface="Consolas" charset="0"/>
+                <a:cs typeface="Consolas" charset="0"/>
+              </a:rPr>
+              <a:t>workspaceFolder</a:t>
+            </a:r>
+            <a:r>
+              <a:rPr lang="en-CA" sz="1200" dirty="0">
+                <a:solidFill>
+                  <a:schemeClr val="bg1"/>
+                </a:solidFill>
+                <a:latin typeface="Consolas" charset="0"/>
+                <a:ea typeface="Consolas" charset="0"/>
+                <a:cs typeface="Consolas" charset="0"/>
+              </a:rPr>
+              <a:t>}/</a:t>
+            </a:r>
+            <a:r>
+              <a:rPr lang="en-CA" sz="1200" dirty="0" smtClean="0">
+                <a:solidFill>
+                  <a:schemeClr val="bg1"/>
+                </a:solidFill>
+                <a:latin typeface="Consolas" charset="0"/>
+                <a:ea typeface="Consolas" charset="0"/>
+                <a:cs typeface="Consolas" charset="0"/>
+              </a:rPr>
+              <a:t>demo/completed-demo”,</a:t>
+            </a:r>
+            <a:endParaRPr lang="en-CA" sz="1200" dirty="0">
               <a:solidFill>
                 <a:schemeClr val="bg1"/>
               </a:solidFill>
+              <a:latin typeface="Consolas" charset="0"/>
               <a:ea typeface="Consolas" charset="0"/>
               <a:cs typeface="Consolas" charset="0"/>
             </a:endParaRPr>
@@ -7069,7 +7773,7 @@
     </p:spTree>
     <p:extLst>
       <p:ext uri="{BB962C8B-B14F-4D97-AF65-F5344CB8AC3E}">
-        <p14:creationId xmlns:p14="http://schemas.microsoft.com/office/powerpoint/2010/main" val="606305934"/>
+        <p14:creationId xmlns:p14="http://schemas.microsoft.com/office/powerpoint/2010/main" val="665206099"/>
       </p:ext>
     </p:extLst>
   </p:cSld>
@@ -8501,6 +9205,941 @@
     <p:extLst>
       <p:ext uri="{BB962C8B-B14F-4D97-AF65-F5344CB8AC3E}">
         <p14:creationId xmlns:p14="http://schemas.microsoft.com/office/powerpoint/2010/main" val="1929562061"/>
+      </p:ext>
+    </p:extLst>
+  </p:cSld>
+  <p:clrMapOvr>
+    <a:masterClrMapping/>
+  </p:clrMapOvr>
+</p:sld>
+</file>
+
+<file path=ppt/slides/slide7.xml><?xml version="1.0" encoding="utf-8"?>
+<p:sld xmlns:a="http://schemas.openxmlformats.org/drawingml/2006/main" xmlns:r="http://schemas.openxmlformats.org/officeDocument/2006/relationships" xmlns:p="http://schemas.openxmlformats.org/presentationml/2006/main">
+  <p:cSld>
+    <p:spTree>
+      <p:nvGrpSpPr>
+        <p:cNvPr id="1" name=""/>
+        <p:cNvGrpSpPr/>
+        <p:nvPr/>
+      </p:nvGrpSpPr>
+      <p:grpSpPr>
+        <a:xfrm>
+          <a:off x="0" y="0"/>
+          <a:ext cx="0" cy="0"/>
+          <a:chOff x="0" y="0"/>
+          <a:chExt cx="0" cy="0"/>
+        </a:xfrm>
+      </p:grpSpPr>
+      <p:sp>
+        <p:nvSpPr>
+          <p:cNvPr id="14" name="Rectangle 8">
+            <a:extLst>
+              <a:ext uri="{FF2B5EF4-FFF2-40B4-BE49-F238E27FC236}">
+                <a16:creationId xmlns="" xmlns:a16="http://schemas.microsoft.com/office/drawing/2014/main" id="{C0B27210-D0CA-4654-B3E3-9ABB4F178EA1}"/>
+              </a:ext>
+              <a:ext uri="{C183D7F6-B498-43B3-948B-1728B52AA6E4}">
+                <adec:decorative xmlns="" xmlns:adec="http://schemas.microsoft.com/office/drawing/2017/decorative" val="1"/>
+              </a:ext>
+            </a:extLst>
+          </p:cNvPr>
+          <p:cNvSpPr>
+            <a:spLocks noGrp="1" noRot="1" noChangeAspect="1" noMove="1" noResize="1" noEditPoints="1" noAdjustHandles="1" noChangeArrowheads="1" noChangeShapeType="1" noTextEdit="1"/>
+          </p:cNvSpPr>
+          <p:nvPr>
+            <p:extLst>
+              <p:ext uri="{386F3935-93C4-4BCD-93E2-E3B085C9AB24}">
+                <p16:designElem xmlns="" xmlns:p16="http://schemas.microsoft.com/office/powerpoint/2015/main" val="1"/>
+              </p:ext>
+            </p:extLst>
+          </p:nvPr>
+        </p:nvSpPr>
+        <p:spPr>
+          <a:xfrm>
+            <a:off x="0" y="0"/>
+            <a:ext cx="12192000" cy="6858000"/>
+          </a:xfrm>
+          <a:prstGeom prst="rect">
+            <a:avLst/>
+          </a:prstGeom>
+          <a:solidFill>
+            <a:schemeClr val="tx1">
+              <a:lumMod val="75000"/>
+              <a:lumOff val="25000"/>
+            </a:schemeClr>
+          </a:solidFill>
+          <a:ln>
+            <a:noFill/>
+          </a:ln>
+        </p:spPr>
+        <p:style>
+          <a:lnRef idx="2">
+            <a:schemeClr val="accent1">
+              <a:shade val="50000"/>
+            </a:schemeClr>
+          </a:lnRef>
+          <a:fillRef idx="1">
+            <a:schemeClr val="accent1"/>
+          </a:fillRef>
+          <a:effectRef idx="0">
+            <a:schemeClr val="accent1"/>
+          </a:effectRef>
+          <a:fontRef idx="minor">
+            <a:schemeClr val="lt1"/>
+          </a:fontRef>
+        </p:style>
+        <p:txBody>
+          <a:bodyPr rtlCol="0" anchor="ctr"/>
+          <a:lstStyle/>
+          <a:p>
+            <a:pPr marL="0" marR="0" lvl="0" indent="0" algn="ctr" defTabSz="914400" rtl="0" eaLnBrk="1" fontAlgn="auto" latinLnBrk="0" hangingPunct="1">
+              <a:lnSpc>
+                <a:spcPct val="100000"/>
+              </a:lnSpc>
+              <a:spcBef>
+                <a:spcPts val="0"/>
+              </a:spcBef>
+              <a:spcAft>
+                <a:spcPts val="0"/>
+              </a:spcAft>
+              <a:buClrTx/>
+              <a:buSzTx/>
+              <a:buFontTx/>
+              <a:buNone/>
+              <a:tabLst/>
+              <a:defRPr/>
+            </a:pPr>
+            <a:endParaRPr kumimoji="0" lang="en-US" sz="1800" b="0" i="0" u="none" strike="noStrike" kern="1200" cap="none" spc="0" normalizeH="0" baseline="0" noProof="0">
+              <a:ln>
+                <a:noFill/>
+              </a:ln>
+              <a:solidFill>
+                <a:srgbClr val="FFFFFF"/>
+              </a:solidFill>
+              <a:effectLst/>
+              <a:uLnTx/>
+              <a:uFillTx/>
+              <a:latin typeface="Calibri" panose="020F0502020204030204"/>
+              <a:ea typeface="+mn-ea"/>
+              <a:cs typeface="+mn-cs"/>
+            </a:endParaRPr>
+          </a:p>
+        </p:txBody>
+      </p:sp>
+      <p:sp>
+        <p:nvSpPr>
+          <p:cNvPr id="2" name="Title 1">
+            <a:extLst>
+              <a:ext uri="{FF2B5EF4-FFF2-40B4-BE49-F238E27FC236}">
+                <a16:creationId xmlns="" xmlns:a16="http://schemas.microsoft.com/office/drawing/2014/main" id="{54A70515-73AA-C04F-9813-DF1C0B2A9BFD}"/>
+              </a:ext>
+            </a:extLst>
+          </p:cNvPr>
+          <p:cNvSpPr>
+            <a:spLocks noGrp="1"/>
+          </p:cNvSpPr>
+          <p:nvPr>
+            <p:ph type="ctrTitle"/>
+          </p:nvPr>
+        </p:nvSpPr>
+        <p:spPr>
+          <a:xfrm>
+            <a:off x="6114910" y="302133"/>
+            <a:ext cx="5795540" cy="919637"/>
+          </a:xfrm>
+        </p:spPr>
+        <p:txBody>
+          <a:bodyPr anchor="b">
+            <a:normAutofit fontScale="90000"/>
+          </a:bodyPr>
+          <a:lstStyle/>
+          <a:p>
+            <a:pPr algn="l"/>
+            <a:r>
+              <a:rPr lang="en-US" sz="3200" b="1" dirty="0" smtClean="0">
+                <a:solidFill>
+                  <a:schemeClr val="bg1"/>
+                </a:solidFill>
+              </a:rPr>
+              <a:t>Project </a:t>
+            </a:r>
+            <a:r>
+              <a:rPr lang="en-US" sz="3200" b="1" dirty="0" err="1" smtClean="0">
+                <a:solidFill>
+                  <a:schemeClr val="bg1"/>
+                </a:solidFill>
+              </a:rPr>
+              <a:t>config</a:t>
+            </a:r>
+            <a:r>
+              <a:rPr lang="en-US" sz="3200" b="1" dirty="0" smtClean="0">
+                <a:solidFill>
+                  <a:schemeClr val="bg1"/>
+                </a:solidFill>
+              </a:rPr>
+              <a:t> (for your own extensions)</a:t>
+            </a:r>
+            <a:endParaRPr lang="en-US" sz="3200" b="1" dirty="0">
+              <a:solidFill>
+                <a:schemeClr val="bg1"/>
+              </a:solidFill>
+            </a:endParaRPr>
+          </a:p>
+        </p:txBody>
+      </p:sp>
+      <p:sp>
+        <p:nvSpPr>
+          <p:cNvPr id="3" name="Subtitle 2">
+            <a:extLst>
+              <a:ext uri="{FF2B5EF4-FFF2-40B4-BE49-F238E27FC236}">
+                <a16:creationId xmlns="" xmlns:a16="http://schemas.microsoft.com/office/drawing/2014/main" id="{E315EF91-FBDB-DB4A-8B91-A223508C716C}"/>
+              </a:ext>
+            </a:extLst>
+          </p:cNvPr>
+          <p:cNvSpPr>
+            <a:spLocks noGrp="1"/>
+          </p:cNvSpPr>
+          <p:nvPr>
+            <p:ph type="subTitle" idx="1"/>
+          </p:nvPr>
+        </p:nvSpPr>
+        <p:spPr>
+          <a:xfrm>
+            <a:off x="6114909" y="1255222"/>
+            <a:ext cx="5787197" cy="5294999"/>
+          </a:xfrm>
+        </p:spPr>
+        <p:txBody>
+          <a:bodyPr anchor="t">
+            <a:noAutofit/>
+          </a:bodyPr>
+          <a:lstStyle/>
+          <a:p>
+            <a:pPr marL="342900" indent="-342900" algn="l">
+              <a:buClr>
+                <a:schemeClr val="bg1"/>
+              </a:buClr>
+              <a:buFont typeface="Arial" panose="020B0604020202020204" pitchFamily="34" charset="0"/>
+              <a:buChar char="•"/>
+            </a:pPr>
+            <a:r>
+              <a:rPr lang="en-US" sz="1600" dirty="0" smtClean="0">
+                <a:solidFill>
+                  <a:schemeClr val="bg1"/>
+                </a:solidFill>
+                <a:ea typeface="Consolas" charset="0"/>
+                <a:cs typeface="Consolas" charset="0"/>
+              </a:rPr>
+              <a:t>Add “</a:t>
+            </a:r>
+            <a:r>
+              <a:rPr lang="en-US" sz="1600" dirty="0" err="1" smtClean="0">
+                <a:solidFill>
+                  <a:schemeClr val="bg1"/>
+                </a:solidFill>
+                <a:ea typeface="Consolas" charset="0"/>
+                <a:cs typeface="Consolas" charset="0"/>
+              </a:rPr>
+              <a:t>sourceMap</a:t>
+            </a:r>
+            <a:r>
+              <a:rPr lang="en-US" sz="1600" dirty="0" smtClean="0">
+                <a:solidFill>
+                  <a:schemeClr val="bg1"/>
+                </a:solidFill>
+                <a:ea typeface="Consolas" charset="0"/>
+                <a:cs typeface="Consolas" charset="0"/>
+              </a:rPr>
+              <a:t>” to </a:t>
+            </a:r>
+            <a:r>
+              <a:rPr lang="en-US" sz="1600" dirty="0" err="1" smtClean="0">
+                <a:solidFill>
+                  <a:schemeClr val="bg1"/>
+                </a:solidFill>
+                <a:ea typeface="Consolas" charset="0"/>
+                <a:cs typeface="Consolas" charset="0"/>
+              </a:rPr>
+              <a:t>tsconfig.json</a:t>
+            </a:r>
+            <a:endParaRPr lang="en-US" sz="1600" dirty="0" smtClean="0">
+              <a:solidFill>
+                <a:schemeClr val="bg1"/>
+              </a:solidFill>
+              <a:latin typeface="Consolas" charset="0"/>
+              <a:ea typeface="Consolas" charset="0"/>
+              <a:cs typeface="Consolas" charset="0"/>
+            </a:endParaRPr>
+          </a:p>
+          <a:p>
+            <a:pPr marL="800100" lvl="1" indent="-342900" algn="l">
+              <a:buClr>
+                <a:schemeClr val="bg1"/>
+              </a:buClr>
+              <a:buFont typeface="Arial" panose="020B0604020202020204" pitchFamily="34" charset="0"/>
+              <a:buChar char="•"/>
+            </a:pPr>
+            <a:r>
+              <a:rPr lang="en-US" sz="1200" dirty="0">
+                <a:solidFill>
+                  <a:schemeClr val="bg1"/>
+                </a:solidFill>
+                <a:latin typeface="Consolas" charset="0"/>
+                <a:ea typeface="Consolas" charset="0"/>
+                <a:cs typeface="Consolas" charset="0"/>
+              </a:rPr>
+              <a:t>"</a:t>
+            </a:r>
+            <a:r>
+              <a:rPr lang="en-US" sz="1200" dirty="0" err="1">
+                <a:solidFill>
+                  <a:schemeClr val="bg1"/>
+                </a:solidFill>
+                <a:latin typeface="Consolas" charset="0"/>
+                <a:ea typeface="Consolas" charset="0"/>
+                <a:cs typeface="Consolas" charset="0"/>
+              </a:rPr>
+              <a:t>sourceMap</a:t>
+            </a:r>
+            <a:r>
+              <a:rPr lang="en-US" sz="1200" dirty="0">
+                <a:solidFill>
+                  <a:schemeClr val="bg1"/>
+                </a:solidFill>
+                <a:latin typeface="Consolas" charset="0"/>
+                <a:ea typeface="Consolas" charset="0"/>
+                <a:cs typeface="Consolas" charset="0"/>
+              </a:rPr>
+              <a:t>": true</a:t>
+            </a:r>
+            <a:r>
+              <a:rPr lang="en-US" sz="1200" dirty="0" smtClean="0">
+                <a:solidFill>
+                  <a:schemeClr val="bg1"/>
+                </a:solidFill>
+                <a:latin typeface="Consolas" charset="0"/>
+                <a:ea typeface="Consolas" charset="0"/>
+                <a:cs typeface="Consolas" charset="0"/>
+              </a:rPr>
+              <a:t>,</a:t>
+            </a:r>
+          </a:p>
+          <a:p>
+            <a:pPr marL="342900" indent="-342900" algn="l">
+              <a:buClr>
+                <a:schemeClr val="bg1"/>
+              </a:buClr>
+              <a:buFont typeface="Arial" panose="020B0604020202020204" pitchFamily="34" charset="0"/>
+              <a:buChar char="•"/>
+            </a:pPr>
+            <a:endParaRPr lang="en-CA" sz="1600" dirty="0" smtClean="0">
+              <a:solidFill>
+                <a:schemeClr val="bg1"/>
+              </a:solidFill>
+              <a:ea typeface="Consolas" charset="0"/>
+              <a:cs typeface="Consolas" charset="0"/>
+            </a:endParaRPr>
+          </a:p>
+          <a:p>
+            <a:pPr marL="342900" indent="-342900" algn="l">
+              <a:buClr>
+                <a:schemeClr val="bg1"/>
+              </a:buClr>
+              <a:buFont typeface="Arial" panose="020B0604020202020204" pitchFamily="34" charset="0"/>
+              <a:buChar char="•"/>
+            </a:pPr>
+            <a:r>
+              <a:rPr lang="en-CA" sz="1600" dirty="0" smtClean="0">
+                <a:solidFill>
+                  <a:schemeClr val="bg1"/>
+                </a:solidFill>
+                <a:ea typeface="Consolas" charset="0"/>
+                <a:cs typeface="Consolas" charset="0"/>
+              </a:rPr>
+              <a:t>Make sure that “files” in </a:t>
+            </a:r>
+            <a:r>
+              <a:rPr lang="en-CA" sz="1600" dirty="0" err="1" smtClean="0">
+                <a:solidFill>
+                  <a:schemeClr val="bg1"/>
+                </a:solidFill>
+                <a:ea typeface="Consolas" charset="0"/>
+                <a:cs typeface="Consolas" charset="0"/>
+              </a:rPr>
+              <a:t>package.json</a:t>
+            </a:r>
+            <a:r>
+              <a:rPr lang="en-CA" sz="1600" dirty="0" smtClean="0">
+                <a:solidFill>
+                  <a:schemeClr val="bg1"/>
+                </a:solidFill>
+                <a:ea typeface="Consolas" charset="0"/>
+                <a:cs typeface="Consolas" charset="0"/>
+              </a:rPr>
+              <a:t> includes </a:t>
+            </a:r>
+            <a:r>
+              <a:rPr lang="en-CA" sz="1600" dirty="0" err="1" smtClean="0">
+                <a:solidFill>
+                  <a:schemeClr val="bg1"/>
+                </a:solidFill>
+                <a:ea typeface="Consolas" charset="0"/>
+                <a:cs typeface="Consolas" charset="0"/>
+              </a:rPr>
+              <a:t>src</a:t>
+            </a:r>
+            <a:endParaRPr lang="en-CA" sz="1600" dirty="0" smtClean="0">
+              <a:solidFill>
+                <a:schemeClr val="bg1"/>
+              </a:solidFill>
+              <a:ea typeface="Consolas" charset="0"/>
+              <a:cs typeface="Consolas" charset="0"/>
+            </a:endParaRPr>
+          </a:p>
+          <a:p>
+            <a:pPr marL="800100" lvl="1" indent="-342900" algn="l">
+              <a:buClr>
+                <a:schemeClr val="bg1"/>
+              </a:buClr>
+              <a:buFont typeface="Arial" panose="020B0604020202020204" pitchFamily="34" charset="0"/>
+              <a:buChar char="•"/>
+            </a:pPr>
+            <a:r>
+              <a:rPr lang="en-CA" sz="1200" dirty="0" smtClean="0">
+                <a:solidFill>
+                  <a:schemeClr val="bg1"/>
+                </a:solidFill>
+                <a:ea typeface="Consolas" charset="0"/>
+                <a:cs typeface="Consolas" charset="0"/>
+              </a:rPr>
+              <a:t>Example:</a:t>
+            </a:r>
+          </a:p>
+          <a:p>
+            <a:pPr lvl="1" algn="l">
+              <a:buClr>
+                <a:schemeClr val="bg1"/>
+              </a:buClr>
+            </a:pPr>
+            <a:endParaRPr lang="en-CA" sz="1200" dirty="0">
+              <a:solidFill>
+                <a:schemeClr val="bg1"/>
+              </a:solidFill>
+              <a:latin typeface="Consolas" charset="0"/>
+              <a:ea typeface="Consolas" charset="0"/>
+              <a:cs typeface="Consolas" charset="0"/>
+            </a:endParaRPr>
+          </a:p>
+        </p:txBody>
+      </p:sp>
+      <p:sp>
+        <p:nvSpPr>
+          <p:cNvPr id="15" name="Freeform: Shape 10">
+            <a:extLst>
+              <a:ext uri="{FF2B5EF4-FFF2-40B4-BE49-F238E27FC236}">
+                <a16:creationId xmlns="" xmlns:a16="http://schemas.microsoft.com/office/drawing/2014/main" id="{1DB7C82F-AB7E-4F0C-B829-FA1B9C415180}"/>
+              </a:ext>
+              <a:ext uri="{C183D7F6-B498-43B3-948B-1728B52AA6E4}">
+                <adec:decorative xmlns="" xmlns:adec="http://schemas.microsoft.com/office/drawing/2017/decorative" val="1"/>
+              </a:ext>
+            </a:extLst>
+          </p:cNvPr>
+          <p:cNvSpPr>
+            <a:spLocks noGrp="1" noRot="1" noChangeAspect="1" noMove="1" noResize="1" noEditPoints="1" noAdjustHandles="1" noChangeArrowheads="1" noChangeShapeType="1" noTextEdit="1"/>
+          </p:cNvSpPr>
+          <p:nvPr>
+            <p:extLst>
+              <p:ext uri="{386F3935-93C4-4BCD-93E2-E3B085C9AB24}">
+                <p16:designElem xmlns="" xmlns:p16="http://schemas.microsoft.com/office/powerpoint/2015/main" val="1"/>
+              </p:ext>
+            </p:extLst>
+          </p:nvPr>
+        </p:nvSpPr>
+        <p:spPr>
+          <a:xfrm flipH="1">
+            <a:off x="0" y="0"/>
+            <a:ext cx="6172782" cy="6858000"/>
+          </a:xfrm>
+          <a:custGeom>
+            <a:avLst/>
+            <a:gdLst>
+              <a:gd name="connsiteX0" fmla="*/ 6172782 w 6172782"/>
+              <a:gd name="connsiteY0" fmla="*/ 0 h 6858000"/>
+              <a:gd name="connsiteX1" fmla="*/ 69075 w 6172782"/>
+              <a:gd name="connsiteY1" fmla="*/ 0 h 6858000"/>
+              <a:gd name="connsiteX2" fmla="*/ 35131 w 6172782"/>
+              <a:gd name="connsiteY2" fmla="*/ 267128 h 6858000"/>
+              <a:gd name="connsiteX3" fmla="*/ 0 w 6172782"/>
+              <a:gd name="connsiteY3" fmla="*/ 962845 h 6858000"/>
+              <a:gd name="connsiteX4" fmla="*/ 3276103 w 6172782"/>
+              <a:gd name="connsiteY4" fmla="*/ 6782205 h 6858000"/>
+              <a:gd name="connsiteX5" fmla="*/ 3407923 w 6172782"/>
+              <a:gd name="connsiteY5" fmla="*/ 6858000 h 6858000"/>
+              <a:gd name="connsiteX6" fmla="*/ 6172782 w 6172782"/>
+              <a:gd name="connsiteY6" fmla="*/ 6858000 h 6858000"/>
+            </a:gdLst>
+            <a:ahLst/>
+            <a:cxnLst>
+              <a:cxn ang="0">
+                <a:pos x="connsiteX0" y="connsiteY0"/>
+              </a:cxn>
+              <a:cxn ang="0">
+                <a:pos x="connsiteX1" y="connsiteY1"/>
+              </a:cxn>
+              <a:cxn ang="0">
+                <a:pos x="connsiteX2" y="connsiteY2"/>
+              </a:cxn>
+              <a:cxn ang="0">
+                <a:pos x="connsiteX3" y="connsiteY3"/>
+              </a:cxn>
+              <a:cxn ang="0">
+                <a:pos x="connsiteX4" y="connsiteY4"/>
+              </a:cxn>
+              <a:cxn ang="0">
+                <a:pos x="connsiteX5" y="connsiteY5"/>
+              </a:cxn>
+              <a:cxn ang="0">
+                <a:pos x="connsiteX6" y="connsiteY6"/>
+              </a:cxn>
+            </a:cxnLst>
+            <a:rect l="l" t="t" r="r" b="b"/>
+            <a:pathLst>
+              <a:path w="6172782" h="6858000">
+                <a:moveTo>
+                  <a:pt x="6172782" y="0"/>
+                </a:moveTo>
+                <a:lnTo>
+                  <a:pt x="69075" y="0"/>
+                </a:lnTo>
+                <a:lnTo>
+                  <a:pt x="35131" y="267128"/>
+                </a:lnTo>
+                <a:cubicBezTo>
+                  <a:pt x="11901" y="495874"/>
+                  <a:pt x="0" y="727970"/>
+                  <a:pt x="0" y="962845"/>
+                </a:cubicBezTo>
+                <a:cubicBezTo>
+                  <a:pt x="0" y="3429034"/>
+                  <a:pt x="1312002" y="5588789"/>
+                  <a:pt x="3276103" y="6782205"/>
+                </a:cubicBezTo>
+                <a:lnTo>
+                  <a:pt x="3407923" y="6858000"/>
+                </a:lnTo>
+                <a:lnTo>
+                  <a:pt x="6172782" y="6858000"/>
+                </a:lnTo>
+                <a:close/>
+              </a:path>
+            </a:pathLst>
+          </a:custGeom>
+          <a:solidFill>
+            <a:schemeClr val="bg1">
+              <a:alpha val="80000"/>
+            </a:schemeClr>
+          </a:solidFill>
+          <a:ln>
+            <a:noFill/>
+          </a:ln>
+        </p:spPr>
+        <p:style>
+          <a:lnRef idx="2">
+            <a:schemeClr val="accent1">
+              <a:shade val="50000"/>
+            </a:schemeClr>
+          </a:lnRef>
+          <a:fillRef idx="1">
+            <a:schemeClr val="accent1"/>
+          </a:fillRef>
+          <a:effectRef idx="0">
+            <a:schemeClr val="accent1"/>
+          </a:effectRef>
+          <a:fontRef idx="minor">
+            <a:schemeClr val="lt1"/>
+          </a:fontRef>
+        </p:style>
+        <p:txBody>
+          <a:bodyPr wrap="square" rtlCol="0" anchor="ctr">
+            <a:noAutofit/>
+          </a:bodyPr>
+          <a:lstStyle/>
+          <a:p>
+            <a:pPr marL="0" marR="0" lvl="0" indent="0" algn="ctr" defTabSz="914400" rtl="0" eaLnBrk="1" fontAlgn="auto" latinLnBrk="0" hangingPunct="1">
+              <a:lnSpc>
+                <a:spcPct val="100000"/>
+              </a:lnSpc>
+              <a:spcBef>
+                <a:spcPts val="0"/>
+              </a:spcBef>
+              <a:spcAft>
+                <a:spcPts val="0"/>
+              </a:spcAft>
+              <a:buClrTx/>
+              <a:buSzTx/>
+              <a:buFontTx/>
+              <a:buNone/>
+              <a:tabLst/>
+              <a:defRPr/>
+            </a:pPr>
+            <a:endParaRPr kumimoji="0" lang="en-US" sz="1800" b="0" i="0" u="none" strike="noStrike" kern="1200" cap="none" spc="0" normalizeH="0" baseline="0" noProof="0">
+              <a:ln>
+                <a:noFill/>
+              </a:ln>
+              <a:solidFill>
+                <a:prstClr val="white"/>
+              </a:solidFill>
+              <a:effectLst/>
+              <a:uLnTx/>
+              <a:uFillTx/>
+              <a:latin typeface="Calibri" panose="020F0502020204030204"/>
+              <a:ea typeface="+mn-ea"/>
+              <a:cs typeface="+mn-cs"/>
+            </a:endParaRPr>
+          </a:p>
+        </p:txBody>
+      </p:sp>
+      <p:sp>
+        <p:nvSpPr>
+          <p:cNvPr id="13" name="Freeform: Shape 12">
+            <a:extLst>
+              <a:ext uri="{FF2B5EF4-FFF2-40B4-BE49-F238E27FC236}">
+                <a16:creationId xmlns="" xmlns:a16="http://schemas.microsoft.com/office/drawing/2014/main" id="{70B66945-4967-4040-926D-DCA44313CDAB}"/>
+              </a:ext>
+              <a:ext uri="{C183D7F6-B498-43B3-948B-1728B52AA6E4}">
+                <adec:decorative xmlns="" xmlns:adec="http://schemas.microsoft.com/office/drawing/2017/decorative" val="1"/>
+              </a:ext>
+            </a:extLst>
+          </p:cNvPr>
+          <p:cNvSpPr>
+            <a:spLocks noGrp="1" noRot="1" noChangeAspect="1" noMove="1" noResize="1" noEditPoints="1" noAdjustHandles="1" noChangeArrowheads="1" noChangeShapeType="1" noTextEdit="1"/>
+          </p:cNvSpPr>
+          <p:nvPr>
+            <p:extLst>
+              <p:ext uri="{386F3935-93C4-4BCD-93E2-E3B085C9AB24}">
+                <p16:designElem xmlns="" xmlns:p16="http://schemas.microsoft.com/office/powerpoint/2015/main" val="1"/>
+              </p:ext>
+            </p:extLst>
+          </p:nvPr>
+        </p:nvSpPr>
+        <p:spPr>
+          <a:xfrm>
+            <a:off x="0" y="0"/>
+            <a:ext cx="6024154" cy="6858000"/>
+          </a:xfrm>
+          <a:custGeom>
+            <a:avLst/>
+            <a:gdLst>
+              <a:gd name="connsiteX0" fmla="*/ 0 w 6024154"/>
+              <a:gd name="connsiteY0" fmla="*/ 0 h 6858000"/>
+              <a:gd name="connsiteX1" fmla="*/ 5953780 w 6024154"/>
+              <a:gd name="connsiteY1" fmla="*/ 0 h 6858000"/>
+              <a:gd name="connsiteX2" fmla="*/ 5989880 w 6024154"/>
+              <a:gd name="connsiteY2" fmla="*/ 284091 h 6858000"/>
+              <a:gd name="connsiteX3" fmla="*/ 6024154 w 6024154"/>
+              <a:gd name="connsiteY3" fmla="*/ 962844 h 6858000"/>
+              <a:gd name="connsiteX4" fmla="*/ 2549934 w 6024154"/>
+              <a:gd name="connsiteY4" fmla="*/ 6800152 h 6858000"/>
+              <a:gd name="connsiteX5" fmla="*/ 2436987 w 6024154"/>
+              <a:gd name="connsiteY5" fmla="*/ 6858000 h 6858000"/>
+              <a:gd name="connsiteX6" fmla="*/ 0 w 6024154"/>
+              <a:gd name="connsiteY6" fmla="*/ 6858000 h 6858000"/>
+            </a:gdLst>
+            <a:ahLst/>
+            <a:cxnLst>
+              <a:cxn ang="0">
+                <a:pos x="connsiteX0" y="connsiteY0"/>
+              </a:cxn>
+              <a:cxn ang="0">
+                <a:pos x="connsiteX1" y="connsiteY1"/>
+              </a:cxn>
+              <a:cxn ang="0">
+                <a:pos x="connsiteX2" y="connsiteY2"/>
+              </a:cxn>
+              <a:cxn ang="0">
+                <a:pos x="connsiteX3" y="connsiteY3"/>
+              </a:cxn>
+              <a:cxn ang="0">
+                <a:pos x="connsiteX4" y="connsiteY4"/>
+              </a:cxn>
+              <a:cxn ang="0">
+                <a:pos x="connsiteX5" y="connsiteY5"/>
+              </a:cxn>
+              <a:cxn ang="0">
+                <a:pos x="connsiteX6" y="connsiteY6"/>
+              </a:cxn>
+            </a:cxnLst>
+            <a:rect l="l" t="t" r="r" b="b"/>
+            <a:pathLst>
+              <a:path w="6024154" h="6858000">
+                <a:moveTo>
+                  <a:pt x="0" y="0"/>
+                </a:moveTo>
+                <a:lnTo>
+                  <a:pt x="5953780" y="0"/>
+                </a:lnTo>
+                <a:lnTo>
+                  <a:pt x="5989880" y="284091"/>
+                </a:lnTo>
+                <a:cubicBezTo>
+                  <a:pt x="6012544" y="507260"/>
+                  <a:pt x="6024154" y="733696"/>
+                  <a:pt x="6024154" y="962844"/>
+                </a:cubicBezTo>
+                <a:cubicBezTo>
+                  <a:pt x="6024154" y="3483472"/>
+                  <a:pt x="4619336" y="5675986"/>
+                  <a:pt x="2549934" y="6800152"/>
+                </a:cubicBezTo>
+                <a:lnTo>
+                  <a:pt x="2436987" y="6858000"/>
+                </a:lnTo>
+                <a:lnTo>
+                  <a:pt x="0" y="6858000"/>
+                </a:lnTo>
+                <a:close/>
+              </a:path>
+            </a:pathLst>
+          </a:custGeom>
+          <a:solidFill>
+            <a:schemeClr val="bg1"/>
+          </a:solidFill>
+          <a:ln>
+            <a:noFill/>
+          </a:ln>
+        </p:spPr>
+        <p:style>
+          <a:lnRef idx="2">
+            <a:schemeClr val="accent1">
+              <a:shade val="50000"/>
+            </a:schemeClr>
+          </a:lnRef>
+          <a:fillRef idx="1">
+            <a:schemeClr val="accent1"/>
+          </a:fillRef>
+          <a:effectRef idx="0">
+            <a:schemeClr val="accent1"/>
+          </a:effectRef>
+          <a:fontRef idx="minor">
+            <a:schemeClr val="lt1"/>
+          </a:fontRef>
+        </p:style>
+        <p:txBody>
+          <a:bodyPr wrap="square" rtlCol="0" anchor="ctr">
+            <a:noAutofit/>
+          </a:bodyPr>
+          <a:lstStyle/>
+          <a:p>
+            <a:pPr marL="0" marR="0" lvl="0" indent="0" algn="ctr" defTabSz="914400" rtl="0" eaLnBrk="1" fontAlgn="auto" latinLnBrk="0" hangingPunct="1">
+              <a:lnSpc>
+                <a:spcPct val="100000"/>
+              </a:lnSpc>
+              <a:spcBef>
+                <a:spcPts val="0"/>
+              </a:spcBef>
+              <a:spcAft>
+                <a:spcPts val="0"/>
+              </a:spcAft>
+              <a:buClrTx/>
+              <a:buSzTx/>
+              <a:buFontTx/>
+              <a:buNone/>
+              <a:tabLst/>
+              <a:defRPr/>
+            </a:pPr>
+            <a:endParaRPr kumimoji="0" lang="en-US" sz="1800" b="0" i="0" u="none" strike="noStrike" kern="1200" cap="none" spc="0" normalizeH="0" baseline="0" noProof="0">
+              <a:ln>
+                <a:noFill/>
+              </a:ln>
+              <a:solidFill>
+                <a:prstClr val="white"/>
+              </a:solidFill>
+              <a:effectLst/>
+              <a:uLnTx/>
+              <a:uFillTx/>
+              <a:latin typeface="Calibri" panose="020F0502020204030204"/>
+              <a:ea typeface="+mn-ea"/>
+              <a:cs typeface="+mn-cs"/>
+            </a:endParaRPr>
+          </a:p>
+        </p:txBody>
+      </p:sp>
+      <p:pic>
+        <p:nvPicPr>
+          <p:cNvPr id="17" name="Picture 16">
+            <a:extLst>
+              <a:ext uri="{FF2B5EF4-FFF2-40B4-BE49-F238E27FC236}">
+                <a16:creationId xmlns="" xmlns:a16="http://schemas.microsoft.com/office/drawing/2014/main" id="{DCE36BD7-46FA-B542-A8A7-DD8681B4AF01}"/>
+              </a:ext>
+            </a:extLst>
+          </p:cNvPr>
+          <p:cNvPicPr>
+            <a:picLocks noChangeAspect="1"/>
+          </p:cNvPicPr>
+          <p:nvPr/>
+        </p:nvPicPr>
+        <p:blipFill>
+          <a:blip r:embed="rId3">
+            <a:alphaModFix amt="50000"/>
+          </a:blip>
+          <a:stretch>
+            <a:fillRect/>
+          </a:stretch>
+        </p:blipFill>
+        <p:spPr>
+          <a:xfrm>
+            <a:off x="991974" y="5118307"/>
+            <a:ext cx="1236219" cy="1431914"/>
+          </a:xfrm>
+          <a:prstGeom prst="rect">
+            <a:avLst/>
+          </a:prstGeom>
+        </p:spPr>
+      </p:pic>
+      <p:sp>
+        <p:nvSpPr>
+          <p:cNvPr id="12" name="Title 1">
+            <a:extLst>
+              <a:ext uri="{FF2B5EF4-FFF2-40B4-BE49-F238E27FC236}">
+                <a16:creationId xmlns="" xmlns:a16="http://schemas.microsoft.com/office/drawing/2014/main" id="{4D05E411-F3A0-214B-8A04-90968E1996B0}"/>
+              </a:ext>
+            </a:extLst>
+          </p:cNvPr>
+          <p:cNvSpPr txBox="1">
+            <a:spLocks/>
+          </p:cNvSpPr>
+          <p:nvPr/>
+        </p:nvSpPr>
+        <p:spPr>
+          <a:xfrm>
+            <a:off x="0" y="1739693"/>
+            <a:ext cx="5170876" cy="1689307"/>
+          </a:xfrm>
+          <a:prstGeom prst="rect">
+            <a:avLst/>
+          </a:prstGeom>
+        </p:spPr>
+        <p:txBody>
+          <a:bodyPr vert="horz" lIns="91440" tIns="45720" rIns="91440" bIns="45720" rtlCol="0" anchor="ctr">
+            <a:normAutofit/>
+          </a:bodyPr>
+          <a:lstStyle>
+            <a:lvl1pPr algn="ctr" defTabSz="914400" rtl="0" eaLnBrk="1" latinLnBrk="0" hangingPunct="1">
+              <a:lnSpc>
+                <a:spcPct val="90000"/>
+              </a:lnSpc>
+              <a:spcBef>
+                <a:spcPct val="0"/>
+              </a:spcBef>
+              <a:buNone/>
+              <a:defRPr sz="6000" kern="1200">
+                <a:solidFill>
+                  <a:schemeClr val="tx1"/>
+                </a:solidFill>
+                <a:latin typeface="+mj-lt"/>
+                <a:ea typeface="+mj-ea"/>
+                <a:cs typeface="+mj-cs"/>
+              </a:defRPr>
+            </a:lvl1pPr>
+          </a:lstStyle>
+          <a:p>
+            <a:pPr algn="l">
+              <a:lnSpc>
+                <a:spcPct val="120000"/>
+              </a:lnSpc>
+            </a:pPr>
+            <a:r>
+              <a:rPr lang="en-US" sz="2000" dirty="0" smtClean="0">
+                <a:solidFill>
+                  <a:schemeClr val="bg2">
+                    <a:lumMod val="75000"/>
+                  </a:schemeClr>
+                </a:solidFill>
+              </a:rPr>
+              <a:t> 	When to debug</a:t>
+            </a:r>
+            <a:endParaRPr lang="en-US" sz="2000" b="1" dirty="0" smtClean="0">
+              <a:solidFill>
+                <a:srgbClr val="E7E6E6">
+                  <a:lumMod val="50000"/>
+                </a:srgbClr>
+              </a:solidFill>
+            </a:endParaRPr>
+          </a:p>
+          <a:p>
+            <a:pPr algn="l">
+              <a:lnSpc>
+                <a:spcPct val="120000"/>
+              </a:lnSpc>
+            </a:pPr>
+            <a:r>
+              <a:rPr lang="en-US" sz="2000" b="1" dirty="0" smtClean="0">
+                <a:solidFill>
+                  <a:srgbClr val="E7E6E6">
+                    <a:lumMod val="50000"/>
+                  </a:srgbClr>
+                </a:solidFill>
+              </a:rPr>
+              <a:t>	How to debug (using </a:t>
+            </a:r>
+            <a:r>
+              <a:rPr lang="en-US" sz="2000" b="1" dirty="0" err="1" smtClean="0">
+                <a:solidFill>
+                  <a:srgbClr val="E7E6E6">
+                    <a:lumMod val="50000"/>
+                  </a:srgbClr>
+                </a:solidFill>
+              </a:rPr>
+              <a:t>vscode</a:t>
+            </a:r>
+            <a:r>
+              <a:rPr lang="en-US" sz="2000" b="1" dirty="0" smtClean="0">
+                <a:solidFill>
+                  <a:srgbClr val="E7E6E6">
+                    <a:lumMod val="50000"/>
+                  </a:srgbClr>
+                </a:solidFill>
+              </a:rPr>
+              <a:t>)</a:t>
+            </a:r>
+            <a:endParaRPr lang="en-US" sz="2000" b="1" dirty="0">
+              <a:solidFill>
+                <a:schemeClr val="bg2">
+                  <a:lumMod val="50000"/>
+                </a:schemeClr>
+              </a:solidFill>
+            </a:endParaRPr>
+          </a:p>
+        </p:txBody>
+      </p:sp>
+      <p:pic>
+        <p:nvPicPr>
+          <p:cNvPr id="5" name="Picture 4"/>
+          <p:cNvPicPr>
+            <a:picLocks noChangeAspect="1"/>
+          </p:cNvPicPr>
+          <p:nvPr/>
+        </p:nvPicPr>
+        <p:blipFill>
+          <a:blip r:embed="rId4"/>
+          <a:stretch>
+            <a:fillRect/>
+          </a:stretch>
+        </p:blipFill>
+        <p:spPr>
+          <a:xfrm>
+            <a:off x="6831189" y="2808047"/>
+            <a:ext cx="5070917" cy="1094674"/>
+          </a:xfrm>
+          <a:prstGeom prst="rect">
+            <a:avLst/>
+          </a:prstGeom>
+        </p:spPr>
+      </p:pic>
+    </p:spTree>
+    <p:extLst>
+      <p:ext uri="{BB962C8B-B14F-4D97-AF65-F5344CB8AC3E}">
+        <p14:creationId xmlns:p14="http://schemas.microsoft.com/office/powerpoint/2010/main" val="606305934"/>
       </p:ext>
     </p:extLst>
   </p:cSld>

</xml_diff>

<commit_message>
added "debugger for chrome" vscode extension req
</commit_message>
<xml_diff>
--- a/slides/3-jupytercon_2020_debug_tutorial.pptx
+++ b/slides/3-jupytercon_2020_debug_tutorial.pptx
@@ -5,7 +5,7 @@
     <p:sldMasterId id="2147483648" r:id="rId1"/>
   </p:sldMasterIdLst>
   <p:notesMasterIdLst>
-    <p:notesMasterId r:id="rId9"/>
+    <p:notesMasterId r:id="rId10"/>
   </p:notesMasterIdLst>
   <p:sldIdLst>
     <p:sldId id="257" r:id="rId2"/>
@@ -15,6 +15,7 @@
     <p:sldId id="261" r:id="rId6"/>
     <p:sldId id="262" r:id="rId7"/>
     <p:sldId id="259" r:id="rId8"/>
+    <p:sldId id="264" r:id="rId9"/>
   </p:sldIdLst>
   <p:sldSz cx="12192000" cy="6858000"/>
   <p:notesSz cx="6858000" cy="9144000"/>
@@ -1392,6 +1393,161 @@
     <p:extLst>
       <p:ext uri="{BB962C8B-B14F-4D97-AF65-F5344CB8AC3E}">
         <p14:creationId xmlns:p14="http://schemas.microsoft.com/office/powerpoint/2010/main" val="373927723"/>
+      </p:ext>
+    </p:extLst>
+  </p:cSld>
+  <p:clrMapOvr>
+    <a:masterClrMapping/>
+  </p:clrMapOvr>
+</p:notes>
+</file>
+
+<file path=ppt/notesSlides/notesSlide7.xml><?xml version="1.0" encoding="utf-8"?>
+<p:notes xmlns:a="http://schemas.openxmlformats.org/drawingml/2006/main" xmlns:r="http://schemas.openxmlformats.org/officeDocument/2006/relationships" xmlns:p="http://schemas.openxmlformats.org/presentationml/2006/main">
+  <p:cSld>
+    <p:spTree>
+      <p:nvGrpSpPr>
+        <p:cNvPr id="1" name=""/>
+        <p:cNvGrpSpPr/>
+        <p:nvPr/>
+      </p:nvGrpSpPr>
+      <p:grpSpPr>
+        <a:xfrm>
+          <a:off x="0" y="0"/>
+          <a:ext cx="0" cy="0"/>
+          <a:chOff x="0" y="0"/>
+          <a:chExt cx="0" cy="0"/>
+        </a:xfrm>
+      </p:grpSpPr>
+      <p:sp>
+        <p:nvSpPr>
+          <p:cNvPr id="2" name="Slide Image Placeholder 1"/>
+          <p:cNvSpPr>
+            <a:spLocks noGrp="1" noRot="1" noChangeAspect="1"/>
+          </p:cNvSpPr>
+          <p:nvPr>
+            <p:ph type="sldImg"/>
+          </p:nvPr>
+        </p:nvSpPr>
+        <p:spPr/>
+      </p:sp>
+      <p:sp>
+        <p:nvSpPr>
+          <p:cNvPr id="3" name="Notes Placeholder 2"/>
+          <p:cNvSpPr>
+            <a:spLocks noGrp="1"/>
+          </p:cNvSpPr>
+          <p:nvPr>
+            <p:ph type="body" idx="1"/>
+          </p:nvPr>
+        </p:nvSpPr>
+        <p:spPr/>
+        <p:txBody>
+          <a:bodyPr/>
+          <a:lstStyle/>
+          <a:p>
+            <a:r>
+              <a:rPr lang="en-US" dirty="0"/>
+              <a:t>Run notebook command: </a:t>
+            </a:r>
+            <a:r>
+              <a:rPr lang="en-US" dirty="0" err="1"/>
+              <a:t>jupyter</a:t>
+            </a:r>
+            <a:r>
+              <a:rPr lang="en-US" dirty="0"/>
+              <a:t> notebook</a:t>
+            </a:r>
+          </a:p>
+        </p:txBody>
+      </p:sp>
+      <p:sp>
+        <p:nvSpPr>
+          <p:cNvPr id="4" name="Slide Number Placeholder 3"/>
+          <p:cNvSpPr>
+            <a:spLocks noGrp="1"/>
+          </p:cNvSpPr>
+          <p:nvPr>
+            <p:ph type="sldNum" sz="quarter" idx="5"/>
+          </p:nvPr>
+        </p:nvSpPr>
+        <p:spPr/>
+        <p:txBody>
+          <a:bodyPr/>
+          <a:lstStyle/>
+          <a:p>
+            <a:pPr marL="0" marR="0" lvl="0" indent="0" algn="r" defTabSz="914400" rtl="0" eaLnBrk="1" fontAlgn="auto" latinLnBrk="0" hangingPunct="1">
+              <a:lnSpc>
+                <a:spcPct val="100000"/>
+              </a:lnSpc>
+              <a:spcBef>
+                <a:spcPts val="0"/>
+              </a:spcBef>
+              <a:spcAft>
+                <a:spcPts val="0"/>
+              </a:spcAft>
+              <a:buClrTx/>
+              <a:buSzTx/>
+              <a:buFontTx/>
+              <a:buNone/>
+              <a:tabLst/>
+              <a:defRPr/>
+            </a:pPr>
+            <a:fld id="{E751F81F-F737-384C-90EC-D4EDDECE9DC1}" type="slidenum">
+              <a:rPr kumimoji="0" lang="en-US" sz="1200" b="0" i="0" u="none" strike="noStrike" kern="1200" cap="none" spc="0" normalizeH="0" baseline="0" noProof="0" smtClean="0">
+                <a:ln>
+                  <a:noFill/>
+                </a:ln>
+                <a:solidFill>
+                  <a:prstClr val="black"/>
+                </a:solidFill>
+                <a:effectLst/>
+                <a:uLnTx/>
+                <a:uFillTx/>
+                <a:latin typeface="Calibri" panose="020F0502020204030204"/>
+                <a:ea typeface="+mn-ea"/>
+                <a:cs typeface="+mn-cs"/>
+              </a:rPr>
+              <a:pPr marL="0" marR="0" lvl="0" indent="0" algn="r" defTabSz="914400" rtl="0" eaLnBrk="1" fontAlgn="auto" latinLnBrk="0" hangingPunct="1">
+                <a:lnSpc>
+                  <a:spcPct val="100000"/>
+                </a:lnSpc>
+                <a:spcBef>
+                  <a:spcPts val="0"/>
+                </a:spcBef>
+                <a:spcAft>
+                  <a:spcPts val="0"/>
+                </a:spcAft>
+                <a:buClrTx/>
+                <a:buSzTx/>
+                <a:buFontTx/>
+                <a:buNone/>
+                <a:tabLst/>
+                <a:defRPr/>
+              </a:pPr>
+              <a:t>8</a:t>
+            </a:fld>
+            <a:endParaRPr kumimoji="0" lang="en-US" sz="1200" b="0" i="0" u="none" strike="noStrike" kern="1200" cap="none" spc="0" normalizeH="0" baseline="0" noProof="0">
+              <a:ln>
+                <a:noFill/>
+              </a:ln>
+              <a:solidFill>
+                <a:prstClr val="black"/>
+              </a:solidFill>
+              <a:effectLst/>
+              <a:uLnTx/>
+              <a:uFillTx/>
+              <a:latin typeface="Calibri" panose="020F0502020204030204"/>
+              <a:ea typeface="+mn-ea"/>
+              <a:cs typeface="+mn-cs"/>
+            </a:endParaRPr>
+          </a:p>
+        </p:txBody>
+      </p:sp>
+    </p:spTree>
+    <p:extLst>
+      <p:ext uri="{BB962C8B-B14F-4D97-AF65-F5344CB8AC3E}">
+        <p14:creationId xmlns:p14="http://schemas.microsoft.com/office/powerpoint/2010/main" val="1544494698"/>
       </p:ext>
     </p:extLst>
   </p:cSld>
@@ -5147,6 +5303,13 @@
   <p:clrMapOvr>
     <a:masterClrMapping/>
   </p:clrMapOvr>
+  <p:timing>
+    <p:tnLst>
+      <p:par>
+        <p:cTn id="1" dur="indefinite" restart="never" nodeType="tmRoot"/>
+      </p:par>
+    </p:tnLst>
+  </p:timing>
 </p:sld>
 </file>
 
@@ -5888,6 +6051,13 @@
   <p:clrMapOvr>
     <a:masterClrMapping/>
   </p:clrMapOvr>
+  <p:timing>
+    <p:tnLst>
+      <p:par>
+        <p:cTn id="1" dur="indefinite" restart="never" nodeType="tmRoot"/>
+      </p:par>
+    </p:tnLst>
+  </p:timing>
 </p:sld>
 </file>
 
@@ -6647,6 +6817,13 @@
   <p:clrMapOvr>
     <a:masterClrMapping/>
   </p:clrMapOvr>
+  <p:timing>
+    <p:tnLst>
+      <p:par>
+        <p:cTn id="1" dur="indefinite" restart="never" nodeType="tmRoot"/>
+      </p:par>
+    </p:tnLst>
+  </p:timing>
 </p:sld>
 </file>
 
@@ -7279,7 +7456,36 @@
               </a:rPr>
               <a:t>demo/completed-demo”,</a:t>
             </a:r>
-            <a:endParaRPr lang="en-CA" sz="1200" dirty="0">
+          </a:p>
+          <a:p>
+            <a:pPr marL="342900" indent="-342900" algn="l">
+              <a:buClr>
+                <a:schemeClr val="bg1"/>
+              </a:buClr>
+              <a:buFont typeface="Arial" panose="020B0604020202020204" pitchFamily="34" charset="0"/>
+              <a:buChar char="•"/>
+            </a:pPr>
+            <a:r>
+              <a:rPr lang="en-CA" sz="1600" dirty="0" smtClean="0">
+                <a:solidFill>
+                  <a:schemeClr val="bg1"/>
+                </a:solidFill>
+                <a:ea typeface="Consolas" charset="0"/>
+                <a:cs typeface="Consolas" charset="0"/>
+              </a:rPr>
+              <a:t>Needs the “Debugger for Chrome” extension for </a:t>
+            </a:r>
+            <a:r>
+              <a:rPr lang="en-CA" sz="1600" dirty="0" err="1" smtClean="0">
+                <a:solidFill>
+                  <a:schemeClr val="bg1"/>
+                </a:solidFill>
+                <a:ea typeface="Consolas" charset="0"/>
+                <a:cs typeface="Consolas" charset="0"/>
+              </a:rPr>
+              <a:t>vscode</a:t>
+            </a:r>
+            <a:endParaRPr lang="en-CA" sz="1600" dirty="0">
               <a:solidFill>
                 <a:schemeClr val="bg1"/>
               </a:solidFill>
@@ -7780,6 +7986,13 @@
   <p:clrMapOvr>
     <a:masterClrMapping/>
   </p:clrMapOvr>
+  <p:timing>
+    <p:tnLst>
+      <p:par>
+        <p:cTn id="1" dur="indefinite" restart="never" nodeType="tmRoot"/>
+      </p:par>
+    </p:tnLst>
+  </p:timing>
 </p:sld>
 </file>
 
@@ -8462,6 +8675,13 @@
   <p:clrMapOvr>
     <a:masterClrMapping/>
   </p:clrMapOvr>
+  <p:timing>
+    <p:tnLst>
+      <p:par>
+        <p:cTn id="1" dur="indefinite" restart="never" nodeType="tmRoot"/>
+      </p:par>
+    </p:tnLst>
+  </p:timing>
 </p:sld>
 </file>
 
@@ -9211,6 +9431,13 @@
   <p:clrMapOvr>
     <a:masterClrMapping/>
   </p:clrMapOvr>
+  <p:timing>
+    <p:tnLst>
+      <p:par>
+        <p:cTn id="1" dur="indefinite" restart="never" nodeType="tmRoot"/>
+      </p:par>
+    </p:tnLst>
+  </p:timing>
 </p:sld>
 </file>
 
@@ -10146,6 +10373,950 @@
   <p:clrMapOvr>
     <a:masterClrMapping/>
   </p:clrMapOvr>
+  <p:timing>
+    <p:tnLst>
+      <p:par>
+        <p:cTn id="1" dur="indefinite" restart="never" nodeType="tmRoot"/>
+      </p:par>
+    </p:tnLst>
+  </p:timing>
+</p:sld>
+</file>
+
+<file path=ppt/slides/slide8.xml><?xml version="1.0" encoding="utf-8"?>
+<p:sld xmlns:a="http://schemas.openxmlformats.org/drawingml/2006/main" xmlns:r="http://schemas.openxmlformats.org/officeDocument/2006/relationships" xmlns:p="http://schemas.openxmlformats.org/presentationml/2006/main">
+  <p:cSld>
+    <p:spTree>
+      <p:nvGrpSpPr>
+        <p:cNvPr id="1" name=""/>
+        <p:cNvGrpSpPr/>
+        <p:nvPr/>
+      </p:nvGrpSpPr>
+      <p:grpSpPr>
+        <a:xfrm>
+          <a:off x="0" y="0"/>
+          <a:ext cx="0" cy="0"/>
+          <a:chOff x="0" y="0"/>
+          <a:chExt cx="0" cy="0"/>
+        </a:xfrm>
+      </p:grpSpPr>
+      <p:sp>
+        <p:nvSpPr>
+          <p:cNvPr id="14" name="Rectangle 8">
+            <a:extLst>
+              <a:ext uri="{FF2B5EF4-FFF2-40B4-BE49-F238E27FC236}">
+                <a16:creationId xmlns="" xmlns:a16="http://schemas.microsoft.com/office/drawing/2014/main" id="{C0B27210-D0CA-4654-B3E3-9ABB4F178EA1}"/>
+              </a:ext>
+              <a:ext uri="{C183D7F6-B498-43B3-948B-1728B52AA6E4}">
+                <adec:decorative xmlns="" xmlns:adec="http://schemas.microsoft.com/office/drawing/2017/decorative" val="1"/>
+              </a:ext>
+            </a:extLst>
+          </p:cNvPr>
+          <p:cNvSpPr>
+            <a:spLocks noGrp="1" noRot="1" noChangeAspect="1" noMove="1" noResize="1" noEditPoints="1" noAdjustHandles="1" noChangeArrowheads="1" noChangeShapeType="1" noTextEdit="1"/>
+          </p:cNvSpPr>
+          <p:nvPr>
+            <p:extLst>
+              <p:ext uri="{386F3935-93C4-4BCD-93E2-E3B085C9AB24}">
+                <p16:designElem xmlns="" xmlns:p16="http://schemas.microsoft.com/office/powerpoint/2015/main" val="1"/>
+              </p:ext>
+            </p:extLst>
+          </p:nvPr>
+        </p:nvSpPr>
+        <p:spPr>
+          <a:xfrm>
+            <a:off x="0" y="0"/>
+            <a:ext cx="12192000" cy="6858000"/>
+          </a:xfrm>
+          <a:prstGeom prst="rect">
+            <a:avLst/>
+          </a:prstGeom>
+          <a:solidFill>
+            <a:schemeClr val="tx1">
+              <a:lumMod val="75000"/>
+              <a:lumOff val="25000"/>
+            </a:schemeClr>
+          </a:solidFill>
+          <a:ln>
+            <a:noFill/>
+          </a:ln>
+        </p:spPr>
+        <p:style>
+          <a:lnRef idx="2">
+            <a:schemeClr val="accent1">
+              <a:shade val="50000"/>
+            </a:schemeClr>
+          </a:lnRef>
+          <a:fillRef idx="1">
+            <a:schemeClr val="accent1"/>
+          </a:fillRef>
+          <a:effectRef idx="0">
+            <a:schemeClr val="accent1"/>
+          </a:effectRef>
+          <a:fontRef idx="minor">
+            <a:schemeClr val="lt1"/>
+          </a:fontRef>
+        </p:style>
+        <p:txBody>
+          <a:bodyPr rtlCol="0" anchor="ctr"/>
+          <a:lstStyle/>
+          <a:p>
+            <a:pPr marL="0" marR="0" lvl="0" indent="0" algn="ctr" defTabSz="914400" rtl="0" eaLnBrk="1" fontAlgn="auto" latinLnBrk="0" hangingPunct="1">
+              <a:lnSpc>
+                <a:spcPct val="100000"/>
+              </a:lnSpc>
+              <a:spcBef>
+                <a:spcPts val="0"/>
+              </a:spcBef>
+              <a:spcAft>
+                <a:spcPts val="0"/>
+              </a:spcAft>
+              <a:buClrTx/>
+              <a:buSzTx/>
+              <a:buFontTx/>
+              <a:buNone/>
+              <a:tabLst/>
+              <a:defRPr/>
+            </a:pPr>
+            <a:endParaRPr kumimoji="0" lang="en-US" sz="1800" b="0" i="0" u="none" strike="noStrike" kern="1200" cap="none" spc="0" normalizeH="0" baseline="0" noProof="0">
+              <a:ln>
+                <a:noFill/>
+              </a:ln>
+              <a:solidFill>
+                <a:srgbClr val="FFFFFF"/>
+              </a:solidFill>
+              <a:effectLst/>
+              <a:uLnTx/>
+              <a:uFillTx/>
+              <a:latin typeface="Calibri" panose="020F0502020204030204"/>
+              <a:ea typeface="+mn-ea"/>
+              <a:cs typeface="+mn-cs"/>
+            </a:endParaRPr>
+          </a:p>
+        </p:txBody>
+      </p:sp>
+      <p:sp>
+        <p:nvSpPr>
+          <p:cNvPr id="2" name="Title 1">
+            <a:extLst>
+              <a:ext uri="{FF2B5EF4-FFF2-40B4-BE49-F238E27FC236}">
+                <a16:creationId xmlns="" xmlns:a16="http://schemas.microsoft.com/office/drawing/2014/main" id="{54A70515-73AA-C04F-9813-DF1C0B2A9BFD}"/>
+              </a:ext>
+            </a:extLst>
+          </p:cNvPr>
+          <p:cNvSpPr>
+            <a:spLocks noGrp="1"/>
+          </p:cNvSpPr>
+          <p:nvPr>
+            <p:ph type="ctrTitle"/>
+          </p:nvPr>
+        </p:nvSpPr>
+        <p:spPr>
+          <a:xfrm>
+            <a:off x="6114910" y="302133"/>
+            <a:ext cx="5795540" cy="919637"/>
+          </a:xfrm>
+        </p:spPr>
+        <p:txBody>
+          <a:bodyPr anchor="b">
+            <a:normAutofit/>
+          </a:bodyPr>
+          <a:lstStyle/>
+          <a:p>
+            <a:pPr algn="l"/>
+            <a:r>
+              <a:rPr lang="en-US" sz="3200" b="1" dirty="0" smtClean="0">
+                <a:solidFill>
+                  <a:schemeClr val="bg1"/>
+                </a:solidFill>
+              </a:rPr>
+              <a:t>If you run into any problems</a:t>
+            </a:r>
+            <a:r>
+              <a:rPr lang="mr-IN" sz="3200" b="1" dirty="0" smtClean="0">
+                <a:solidFill>
+                  <a:schemeClr val="bg1"/>
+                </a:solidFill>
+              </a:rPr>
+              <a:t>…</a:t>
+            </a:r>
+            <a:endParaRPr lang="en-US" sz="3200" b="1" dirty="0">
+              <a:solidFill>
+                <a:schemeClr val="bg1"/>
+              </a:solidFill>
+            </a:endParaRPr>
+          </a:p>
+        </p:txBody>
+      </p:sp>
+      <p:sp>
+        <p:nvSpPr>
+          <p:cNvPr id="3" name="Subtitle 2">
+            <a:extLst>
+              <a:ext uri="{FF2B5EF4-FFF2-40B4-BE49-F238E27FC236}">
+                <a16:creationId xmlns="" xmlns:a16="http://schemas.microsoft.com/office/drawing/2014/main" id="{E315EF91-FBDB-DB4A-8B91-A223508C716C}"/>
+              </a:ext>
+            </a:extLst>
+          </p:cNvPr>
+          <p:cNvSpPr>
+            <a:spLocks noGrp="1"/>
+          </p:cNvSpPr>
+          <p:nvPr>
+            <p:ph type="subTitle" idx="1"/>
+          </p:nvPr>
+        </p:nvSpPr>
+        <p:spPr>
+          <a:xfrm>
+            <a:off x="6114909" y="1255222"/>
+            <a:ext cx="5787197" cy="5294999"/>
+          </a:xfrm>
+        </p:spPr>
+        <p:txBody>
+          <a:bodyPr anchor="t">
+            <a:noAutofit/>
+          </a:bodyPr>
+          <a:lstStyle/>
+          <a:p>
+            <a:pPr marL="342900" indent="-342900" algn="l">
+              <a:buClr>
+                <a:schemeClr val="bg1"/>
+              </a:buClr>
+              <a:buFont typeface="Arial" panose="020B0604020202020204" pitchFamily="34" charset="0"/>
+              <a:buChar char="•"/>
+            </a:pPr>
+            <a:r>
+              <a:rPr lang="en-CA" sz="1600" dirty="0" smtClean="0">
+                <a:solidFill>
+                  <a:schemeClr val="bg1"/>
+                </a:solidFill>
+                <a:ea typeface="Consolas" charset="0"/>
+                <a:cs typeface="Consolas" charset="0"/>
+              </a:rPr>
+              <a:t>Please make an issue on the </a:t>
+            </a:r>
+            <a:r>
+              <a:rPr lang="en-CA" sz="1600" dirty="0" err="1" smtClean="0">
+                <a:solidFill>
+                  <a:schemeClr val="bg1"/>
+                </a:solidFill>
+                <a:ea typeface="Consolas" charset="0"/>
+                <a:cs typeface="Consolas" charset="0"/>
+              </a:rPr>
+              <a:t>jupyterlab</a:t>
+            </a:r>
+            <a:r>
+              <a:rPr lang="en-CA" sz="1600" dirty="0" smtClean="0">
+                <a:solidFill>
+                  <a:schemeClr val="bg1"/>
+                </a:solidFill>
+                <a:ea typeface="Consolas" charset="0"/>
+                <a:cs typeface="Consolas" charset="0"/>
+              </a:rPr>
+              <a:t>/debug-</a:t>
+            </a:r>
+            <a:r>
+              <a:rPr lang="en-CA" sz="1600" dirty="0" err="1" smtClean="0">
+                <a:solidFill>
+                  <a:schemeClr val="bg1"/>
+                </a:solidFill>
+                <a:ea typeface="Consolas" charset="0"/>
+                <a:cs typeface="Consolas" charset="0"/>
+              </a:rPr>
+              <a:t>config</a:t>
+            </a:r>
+            <a:r>
+              <a:rPr lang="en-CA" sz="1600" dirty="0" smtClean="0">
+                <a:solidFill>
+                  <a:schemeClr val="bg1"/>
+                </a:solidFill>
+                <a:ea typeface="Consolas" charset="0"/>
+                <a:cs typeface="Consolas" charset="0"/>
+              </a:rPr>
+              <a:t>-</a:t>
+            </a:r>
+            <a:r>
+              <a:rPr lang="en-CA" sz="1600" dirty="0" err="1" smtClean="0">
+                <a:solidFill>
+                  <a:schemeClr val="bg1"/>
+                </a:solidFill>
+                <a:ea typeface="Consolas" charset="0"/>
+                <a:cs typeface="Consolas" charset="0"/>
+              </a:rPr>
+              <a:t>cookiecutter</a:t>
+            </a:r>
+            <a:r>
+              <a:rPr lang="en-CA" sz="1600" dirty="0">
+                <a:solidFill>
+                  <a:schemeClr val="bg1"/>
+                </a:solidFill>
+                <a:ea typeface="Consolas" charset="0"/>
+                <a:cs typeface="Consolas" charset="0"/>
+              </a:rPr>
+              <a:t> repo:</a:t>
+            </a:r>
+            <a:br>
+              <a:rPr lang="en-CA" sz="1600" dirty="0">
+                <a:solidFill>
+                  <a:schemeClr val="bg1"/>
+                </a:solidFill>
+                <a:ea typeface="Consolas" charset="0"/>
+                <a:cs typeface="Consolas" charset="0"/>
+              </a:rPr>
+            </a:br>
+            <a:r>
+              <a:rPr lang="en-CA" sz="1600" dirty="0">
+                <a:solidFill>
+                  <a:schemeClr val="bg1"/>
+                </a:solidFill>
+                <a:ea typeface="Consolas" charset="0"/>
+                <a:cs typeface="Consolas" charset="0"/>
+              </a:rPr>
+              <a:t/>
+            </a:r>
+            <a:br>
+              <a:rPr lang="en-CA" sz="1600" dirty="0">
+                <a:solidFill>
+                  <a:schemeClr val="bg1"/>
+                </a:solidFill>
+                <a:ea typeface="Consolas" charset="0"/>
+                <a:cs typeface="Consolas" charset="0"/>
+              </a:rPr>
+            </a:br>
+            <a:r>
+              <a:rPr lang="en-CA" sz="1600" dirty="0">
+                <a:solidFill>
+                  <a:schemeClr val="bg1"/>
+                </a:solidFill>
+                <a:ea typeface="Consolas" charset="0"/>
+                <a:cs typeface="Consolas" charset="0"/>
+                <a:hlinkClick r:id="rId3"/>
+              </a:rPr>
+              <a:t>https://</a:t>
+            </a:r>
+            <a:r>
+              <a:rPr lang="en-CA" sz="1600" dirty="0" smtClean="0">
+                <a:solidFill>
+                  <a:schemeClr val="bg1"/>
+                </a:solidFill>
+                <a:ea typeface="Consolas" charset="0"/>
+                <a:cs typeface="Consolas" charset="0"/>
+                <a:hlinkClick r:id="rId3"/>
+              </a:rPr>
+              <a:t>github.com/jupyterlab/debug-config-cookiecutter/issues</a:t>
+            </a:r>
+            <a:endParaRPr lang="en-CA" sz="1600" dirty="0" smtClean="0">
+              <a:solidFill>
+                <a:schemeClr val="bg1"/>
+              </a:solidFill>
+              <a:ea typeface="Consolas" charset="0"/>
+              <a:cs typeface="Consolas" charset="0"/>
+            </a:endParaRPr>
+          </a:p>
+          <a:p>
+            <a:pPr marL="342900" indent="-342900" algn="l">
+              <a:buClr>
+                <a:schemeClr val="bg1"/>
+              </a:buClr>
+              <a:buFont typeface="Arial" panose="020B0604020202020204" pitchFamily="34" charset="0"/>
+              <a:buChar char="•"/>
+            </a:pPr>
+            <a:r>
+              <a:rPr lang="en-CA" sz="1600" dirty="0">
+                <a:solidFill>
+                  <a:schemeClr val="bg1"/>
+                </a:solidFill>
+                <a:ea typeface="Consolas" charset="0"/>
+                <a:cs typeface="Consolas" charset="0"/>
+              </a:rPr>
+              <a:t>Example video:</a:t>
+            </a:r>
+            <a:br>
+              <a:rPr lang="en-CA" sz="1600" dirty="0">
+                <a:solidFill>
+                  <a:schemeClr val="bg1"/>
+                </a:solidFill>
+                <a:ea typeface="Consolas" charset="0"/>
+                <a:cs typeface="Consolas" charset="0"/>
+              </a:rPr>
+            </a:br>
+            <a:r>
+              <a:rPr lang="en-CA" sz="1600" dirty="0">
+                <a:solidFill>
+                  <a:schemeClr val="bg1"/>
+                </a:solidFill>
+                <a:ea typeface="Consolas" charset="0"/>
+                <a:cs typeface="Consolas" charset="0"/>
+              </a:rPr>
+              <a:t/>
+            </a:r>
+            <a:br>
+              <a:rPr lang="en-CA" sz="1600" dirty="0">
+                <a:solidFill>
+                  <a:schemeClr val="bg1"/>
+                </a:solidFill>
+                <a:ea typeface="Consolas" charset="0"/>
+                <a:cs typeface="Consolas" charset="0"/>
+              </a:rPr>
+            </a:br>
+            <a:r>
+              <a:rPr lang="en-CA" sz="1600" dirty="0">
+                <a:solidFill>
+                  <a:schemeClr val="bg1"/>
+                </a:solidFill>
+                <a:ea typeface="Consolas" charset="0"/>
+                <a:cs typeface="Consolas" charset="0"/>
+                <a:hlinkClick r:id="rId4"/>
+              </a:rPr>
+              <a:t>https://</a:t>
+            </a:r>
+            <a:r>
+              <a:rPr lang="en-CA" sz="1600" dirty="0" smtClean="0">
+                <a:solidFill>
+                  <a:schemeClr val="bg1"/>
+                </a:solidFill>
+                <a:ea typeface="Consolas" charset="0"/>
+                <a:cs typeface="Consolas" charset="0"/>
+                <a:hlinkClick r:id="rId4"/>
+              </a:rPr>
+              <a:t>youtu.be/VB-0o6JZVE4</a:t>
+            </a:r>
+            <a:endParaRPr lang="en-CA" sz="1600" dirty="0" smtClean="0">
+              <a:solidFill>
+                <a:schemeClr val="bg1"/>
+              </a:solidFill>
+              <a:ea typeface="Consolas" charset="0"/>
+              <a:cs typeface="Consolas" charset="0"/>
+            </a:endParaRPr>
+          </a:p>
+          <a:p>
+            <a:pPr marL="342900" indent="-342900" algn="l">
+              <a:buClr>
+                <a:schemeClr val="bg1"/>
+              </a:buClr>
+              <a:buFont typeface="Arial" panose="020B0604020202020204" pitchFamily="34" charset="0"/>
+              <a:buChar char="•"/>
+            </a:pPr>
+            <a:endParaRPr lang="en-CA" sz="1600" dirty="0" smtClean="0">
+              <a:solidFill>
+                <a:schemeClr val="bg1"/>
+              </a:solidFill>
+              <a:ea typeface="Consolas" charset="0"/>
+              <a:cs typeface="Consolas" charset="0"/>
+            </a:endParaRPr>
+          </a:p>
+          <a:p>
+            <a:pPr lvl="1" algn="l">
+              <a:buClr>
+                <a:schemeClr val="bg1"/>
+              </a:buClr>
+            </a:pPr>
+            <a:endParaRPr lang="en-CA" sz="1200" dirty="0">
+              <a:solidFill>
+                <a:schemeClr val="bg1"/>
+              </a:solidFill>
+              <a:latin typeface="Consolas" charset="0"/>
+              <a:ea typeface="Consolas" charset="0"/>
+              <a:cs typeface="Consolas" charset="0"/>
+            </a:endParaRPr>
+          </a:p>
+        </p:txBody>
+      </p:sp>
+      <p:sp>
+        <p:nvSpPr>
+          <p:cNvPr id="15" name="Freeform: Shape 10">
+            <a:extLst>
+              <a:ext uri="{FF2B5EF4-FFF2-40B4-BE49-F238E27FC236}">
+                <a16:creationId xmlns="" xmlns:a16="http://schemas.microsoft.com/office/drawing/2014/main" id="{1DB7C82F-AB7E-4F0C-B829-FA1B9C415180}"/>
+              </a:ext>
+              <a:ext uri="{C183D7F6-B498-43B3-948B-1728B52AA6E4}">
+                <adec:decorative xmlns="" xmlns:adec="http://schemas.microsoft.com/office/drawing/2017/decorative" val="1"/>
+              </a:ext>
+            </a:extLst>
+          </p:cNvPr>
+          <p:cNvSpPr>
+            <a:spLocks noGrp="1" noRot="1" noChangeAspect="1" noMove="1" noResize="1" noEditPoints="1" noAdjustHandles="1" noChangeArrowheads="1" noChangeShapeType="1" noTextEdit="1"/>
+          </p:cNvSpPr>
+          <p:nvPr>
+            <p:extLst>
+              <p:ext uri="{386F3935-93C4-4BCD-93E2-E3B085C9AB24}">
+                <p16:designElem xmlns="" xmlns:p16="http://schemas.microsoft.com/office/powerpoint/2015/main" val="1"/>
+              </p:ext>
+            </p:extLst>
+          </p:nvPr>
+        </p:nvSpPr>
+        <p:spPr>
+          <a:xfrm flipH="1">
+            <a:off x="0" y="0"/>
+            <a:ext cx="6172782" cy="6858000"/>
+          </a:xfrm>
+          <a:custGeom>
+            <a:avLst/>
+            <a:gdLst>
+              <a:gd name="connsiteX0" fmla="*/ 6172782 w 6172782"/>
+              <a:gd name="connsiteY0" fmla="*/ 0 h 6858000"/>
+              <a:gd name="connsiteX1" fmla="*/ 69075 w 6172782"/>
+              <a:gd name="connsiteY1" fmla="*/ 0 h 6858000"/>
+              <a:gd name="connsiteX2" fmla="*/ 35131 w 6172782"/>
+              <a:gd name="connsiteY2" fmla="*/ 267128 h 6858000"/>
+              <a:gd name="connsiteX3" fmla="*/ 0 w 6172782"/>
+              <a:gd name="connsiteY3" fmla="*/ 962845 h 6858000"/>
+              <a:gd name="connsiteX4" fmla="*/ 3276103 w 6172782"/>
+              <a:gd name="connsiteY4" fmla="*/ 6782205 h 6858000"/>
+              <a:gd name="connsiteX5" fmla="*/ 3407923 w 6172782"/>
+              <a:gd name="connsiteY5" fmla="*/ 6858000 h 6858000"/>
+              <a:gd name="connsiteX6" fmla="*/ 6172782 w 6172782"/>
+              <a:gd name="connsiteY6" fmla="*/ 6858000 h 6858000"/>
+            </a:gdLst>
+            <a:ahLst/>
+            <a:cxnLst>
+              <a:cxn ang="0">
+                <a:pos x="connsiteX0" y="connsiteY0"/>
+              </a:cxn>
+              <a:cxn ang="0">
+                <a:pos x="connsiteX1" y="connsiteY1"/>
+              </a:cxn>
+              <a:cxn ang="0">
+                <a:pos x="connsiteX2" y="connsiteY2"/>
+              </a:cxn>
+              <a:cxn ang="0">
+                <a:pos x="connsiteX3" y="connsiteY3"/>
+              </a:cxn>
+              <a:cxn ang="0">
+                <a:pos x="connsiteX4" y="connsiteY4"/>
+              </a:cxn>
+              <a:cxn ang="0">
+                <a:pos x="connsiteX5" y="connsiteY5"/>
+              </a:cxn>
+              <a:cxn ang="0">
+                <a:pos x="connsiteX6" y="connsiteY6"/>
+              </a:cxn>
+            </a:cxnLst>
+            <a:rect l="l" t="t" r="r" b="b"/>
+            <a:pathLst>
+              <a:path w="6172782" h="6858000">
+                <a:moveTo>
+                  <a:pt x="6172782" y="0"/>
+                </a:moveTo>
+                <a:lnTo>
+                  <a:pt x="69075" y="0"/>
+                </a:lnTo>
+                <a:lnTo>
+                  <a:pt x="35131" y="267128"/>
+                </a:lnTo>
+                <a:cubicBezTo>
+                  <a:pt x="11901" y="495874"/>
+                  <a:pt x="0" y="727970"/>
+                  <a:pt x="0" y="962845"/>
+                </a:cubicBezTo>
+                <a:cubicBezTo>
+                  <a:pt x="0" y="3429034"/>
+                  <a:pt x="1312002" y="5588789"/>
+                  <a:pt x="3276103" y="6782205"/>
+                </a:cubicBezTo>
+                <a:lnTo>
+                  <a:pt x="3407923" y="6858000"/>
+                </a:lnTo>
+                <a:lnTo>
+                  <a:pt x="6172782" y="6858000"/>
+                </a:lnTo>
+                <a:close/>
+              </a:path>
+            </a:pathLst>
+          </a:custGeom>
+          <a:solidFill>
+            <a:schemeClr val="bg1">
+              <a:alpha val="80000"/>
+            </a:schemeClr>
+          </a:solidFill>
+          <a:ln>
+            <a:noFill/>
+          </a:ln>
+        </p:spPr>
+        <p:style>
+          <a:lnRef idx="2">
+            <a:schemeClr val="accent1">
+              <a:shade val="50000"/>
+            </a:schemeClr>
+          </a:lnRef>
+          <a:fillRef idx="1">
+            <a:schemeClr val="accent1"/>
+          </a:fillRef>
+          <a:effectRef idx="0">
+            <a:schemeClr val="accent1"/>
+          </a:effectRef>
+          <a:fontRef idx="minor">
+            <a:schemeClr val="lt1"/>
+          </a:fontRef>
+        </p:style>
+        <p:txBody>
+          <a:bodyPr wrap="square" rtlCol="0" anchor="ctr">
+            <a:noAutofit/>
+          </a:bodyPr>
+          <a:lstStyle/>
+          <a:p>
+            <a:pPr marL="0" marR="0" lvl="0" indent="0" algn="ctr" defTabSz="914400" rtl="0" eaLnBrk="1" fontAlgn="auto" latinLnBrk="0" hangingPunct="1">
+              <a:lnSpc>
+                <a:spcPct val="100000"/>
+              </a:lnSpc>
+              <a:spcBef>
+                <a:spcPts val="0"/>
+              </a:spcBef>
+              <a:spcAft>
+                <a:spcPts val="0"/>
+              </a:spcAft>
+              <a:buClrTx/>
+              <a:buSzTx/>
+              <a:buFontTx/>
+              <a:buNone/>
+              <a:tabLst/>
+              <a:defRPr/>
+            </a:pPr>
+            <a:endParaRPr kumimoji="0" lang="en-US" sz="1800" b="0" i="0" u="none" strike="noStrike" kern="1200" cap="none" spc="0" normalizeH="0" baseline="0" noProof="0">
+              <a:ln>
+                <a:noFill/>
+              </a:ln>
+              <a:solidFill>
+                <a:prstClr val="white"/>
+              </a:solidFill>
+              <a:effectLst/>
+              <a:uLnTx/>
+              <a:uFillTx/>
+              <a:latin typeface="Calibri" panose="020F0502020204030204"/>
+              <a:ea typeface="+mn-ea"/>
+              <a:cs typeface="+mn-cs"/>
+            </a:endParaRPr>
+          </a:p>
+        </p:txBody>
+      </p:sp>
+      <p:sp>
+        <p:nvSpPr>
+          <p:cNvPr id="13" name="Freeform: Shape 12">
+            <a:extLst>
+              <a:ext uri="{FF2B5EF4-FFF2-40B4-BE49-F238E27FC236}">
+                <a16:creationId xmlns="" xmlns:a16="http://schemas.microsoft.com/office/drawing/2014/main" id="{70B66945-4967-4040-926D-DCA44313CDAB}"/>
+              </a:ext>
+              <a:ext uri="{C183D7F6-B498-43B3-948B-1728B52AA6E4}">
+                <adec:decorative xmlns="" xmlns:adec="http://schemas.microsoft.com/office/drawing/2017/decorative" val="1"/>
+              </a:ext>
+            </a:extLst>
+          </p:cNvPr>
+          <p:cNvSpPr>
+            <a:spLocks noGrp="1" noRot="1" noChangeAspect="1" noMove="1" noResize="1" noEditPoints="1" noAdjustHandles="1" noChangeArrowheads="1" noChangeShapeType="1" noTextEdit="1"/>
+          </p:cNvSpPr>
+          <p:nvPr>
+            <p:extLst>
+              <p:ext uri="{386F3935-93C4-4BCD-93E2-E3B085C9AB24}">
+                <p16:designElem xmlns="" xmlns:p16="http://schemas.microsoft.com/office/powerpoint/2015/main" val="1"/>
+              </p:ext>
+            </p:extLst>
+          </p:nvPr>
+        </p:nvSpPr>
+        <p:spPr>
+          <a:xfrm>
+            <a:off x="0" y="0"/>
+            <a:ext cx="6024154" cy="6858000"/>
+          </a:xfrm>
+          <a:custGeom>
+            <a:avLst/>
+            <a:gdLst>
+              <a:gd name="connsiteX0" fmla="*/ 0 w 6024154"/>
+              <a:gd name="connsiteY0" fmla="*/ 0 h 6858000"/>
+              <a:gd name="connsiteX1" fmla="*/ 5953780 w 6024154"/>
+              <a:gd name="connsiteY1" fmla="*/ 0 h 6858000"/>
+              <a:gd name="connsiteX2" fmla="*/ 5989880 w 6024154"/>
+              <a:gd name="connsiteY2" fmla="*/ 284091 h 6858000"/>
+              <a:gd name="connsiteX3" fmla="*/ 6024154 w 6024154"/>
+              <a:gd name="connsiteY3" fmla="*/ 962844 h 6858000"/>
+              <a:gd name="connsiteX4" fmla="*/ 2549934 w 6024154"/>
+              <a:gd name="connsiteY4" fmla="*/ 6800152 h 6858000"/>
+              <a:gd name="connsiteX5" fmla="*/ 2436987 w 6024154"/>
+              <a:gd name="connsiteY5" fmla="*/ 6858000 h 6858000"/>
+              <a:gd name="connsiteX6" fmla="*/ 0 w 6024154"/>
+              <a:gd name="connsiteY6" fmla="*/ 6858000 h 6858000"/>
+            </a:gdLst>
+            <a:ahLst/>
+            <a:cxnLst>
+              <a:cxn ang="0">
+                <a:pos x="connsiteX0" y="connsiteY0"/>
+              </a:cxn>
+              <a:cxn ang="0">
+                <a:pos x="connsiteX1" y="connsiteY1"/>
+              </a:cxn>
+              <a:cxn ang="0">
+                <a:pos x="connsiteX2" y="connsiteY2"/>
+              </a:cxn>
+              <a:cxn ang="0">
+                <a:pos x="connsiteX3" y="connsiteY3"/>
+              </a:cxn>
+              <a:cxn ang="0">
+                <a:pos x="connsiteX4" y="connsiteY4"/>
+              </a:cxn>
+              <a:cxn ang="0">
+                <a:pos x="connsiteX5" y="connsiteY5"/>
+              </a:cxn>
+              <a:cxn ang="0">
+                <a:pos x="connsiteX6" y="connsiteY6"/>
+              </a:cxn>
+            </a:cxnLst>
+            <a:rect l="l" t="t" r="r" b="b"/>
+            <a:pathLst>
+              <a:path w="6024154" h="6858000">
+                <a:moveTo>
+                  <a:pt x="0" y="0"/>
+                </a:moveTo>
+                <a:lnTo>
+                  <a:pt x="5953780" y="0"/>
+                </a:lnTo>
+                <a:lnTo>
+                  <a:pt x="5989880" y="284091"/>
+                </a:lnTo>
+                <a:cubicBezTo>
+                  <a:pt x="6012544" y="507260"/>
+                  <a:pt x="6024154" y="733696"/>
+                  <a:pt x="6024154" y="962844"/>
+                </a:cubicBezTo>
+                <a:cubicBezTo>
+                  <a:pt x="6024154" y="3483472"/>
+                  <a:pt x="4619336" y="5675986"/>
+                  <a:pt x="2549934" y="6800152"/>
+                </a:cubicBezTo>
+                <a:lnTo>
+                  <a:pt x="2436987" y="6858000"/>
+                </a:lnTo>
+                <a:lnTo>
+                  <a:pt x="0" y="6858000"/>
+                </a:lnTo>
+                <a:close/>
+              </a:path>
+            </a:pathLst>
+          </a:custGeom>
+          <a:solidFill>
+            <a:schemeClr val="bg1"/>
+          </a:solidFill>
+          <a:ln>
+            <a:noFill/>
+          </a:ln>
+        </p:spPr>
+        <p:style>
+          <a:lnRef idx="2">
+            <a:schemeClr val="accent1">
+              <a:shade val="50000"/>
+            </a:schemeClr>
+          </a:lnRef>
+          <a:fillRef idx="1">
+            <a:schemeClr val="accent1"/>
+          </a:fillRef>
+          <a:effectRef idx="0">
+            <a:schemeClr val="accent1"/>
+          </a:effectRef>
+          <a:fontRef idx="minor">
+            <a:schemeClr val="lt1"/>
+          </a:fontRef>
+        </p:style>
+        <p:txBody>
+          <a:bodyPr wrap="square" rtlCol="0" anchor="ctr">
+            <a:noAutofit/>
+          </a:bodyPr>
+          <a:lstStyle/>
+          <a:p>
+            <a:pPr marL="0" marR="0" lvl="0" indent="0" algn="ctr" defTabSz="914400" rtl="0" eaLnBrk="1" fontAlgn="auto" latinLnBrk="0" hangingPunct="1">
+              <a:lnSpc>
+                <a:spcPct val="100000"/>
+              </a:lnSpc>
+              <a:spcBef>
+                <a:spcPts val="0"/>
+              </a:spcBef>
+              <a:spcAft>
+                <a:spcPts val="0"/>
+              </a:spcAft>
+              <a:buClrTx/>
+              <a:buSzTx/>
+              <a:buFontTx/>
+              <a:buNone/>
+              <a:tabLst/>
+              <a:defRPr/>
+            </a:pPr>
+            <a:endParaRPr kumimoji="0" lang="en-US" sz="1800" b="0" i="0" u="none" strike="noStrike" kern="1200" cap="none" spc="0" normalizeH="0" baseline="0" noProof="0">
+              <a:ln>
+                <a:noFill/>
+              </a:ln>
+              <a:solidFill>
+                <a:prstClr val="white"/>
+              </a:solidFill>
+              <a:effectLst/>
+              <a:uLnTx/>
+              <a:uFillTx/>
+              <a:latin typeface="Calibri" panose="020F0502020204030204"/>
+              <a:ea typeface="+mn-ea"/>
+              <a:cs typeface="+mn-cs"/>
+            </a:endParaRPr>
+          </a:p>
+        </p:txBody>
+      </p:sp>
+      <p:pic>
+        <p:nvPicPr>
+          <p:cNvPr id="17" name="Picture 16">
+            <a:extLst>
+              <a:ext uri="{FF2B5EF4-FFF2-40B4-BE49-F238E27FC236}">
+                <a16:creationId xmlns="" xmlns:a16="http://schemas.microsoft.com/office/drawing/2014/main" id="{DCE36BD7-46FA-B542-A8A7-DD8681B4AF01}"/>
+              </a:ext>
+            </a:extLst>
+          </p:cNvPr>
+          <p:cNvPicPr>
+            <a:picLocks noChangeAspect="1"/>
+          </p:cNvPicPr>
+          <p:nvPr/>
+        </p:nvPicPr>
+        <p:blipFill>
+          <a:blip r:embed="rId5">
+            <a:alphaModFix amt="50000"/>
+          </a:blip>
+          <a:stretch>
+            <a:fillRect/>
+          </a:stretch>
+        </p:blipFill>
+        <p:spPr>
+          <a:xfrm>
+            <a:off x="991974" y="5118307"/>
+            <a:ext cx="1236219" cy="1431914"/>
+          </a:xfrm>
+          <a:prstGeom prst="rect">
+            <a:avLst/>
+          </a:prstGeom>
+        </p:spPr>
+      </p:pic>
+      <p:sp>
+        <p:nvSpPr>
+          <p:cNvPr id="12" name="Title 1">
+            <a:extLst>
+              <a:ext uri="{FF2B5EF4-FFF2-40B4-BE49-F238E27FC236}">
+                <a16:creationId xmlns="" xmlns:a16="http://schemas.microsoft.com/office/drawing/2014/main" id="{4D05E411-F3A0-214B-8A04-90968E1996B0}"/>
+              </a:ext>
+            </a:extLst>
+          </p:cNvPr>
+          <p:cNvSpPr txBox="1">
+            <a:spLocks/>
+          </p:cNvSpPr>
+          <p:nvPr/>
+        </p:nvSpPr>
+        <p:spPr>
+          <a:xfrm>
+            <a:off x="0" y="1739693"/>
+            <a:ext cx="5170876" cy="1689307"/>
+          </a:xfrm>
+          <a:prstGeom prst="rect">
+            <a:avLst/>
+          </a:prstGeom>
+        </p:spPr>
+        <p:txBody>
+          <a:bodyPr vert="horz" lIns="91440" tIns="45720" rIns="91440" bIns="45720" rtlCol="0" anchor="ctr">
+            <a:normAutofit/>
+          </a:bodyPr>
+          <a:lstStyle>
+            <a:lvl1pPr algn="ctr" defTabSz="914400" rtl="0" eaLnBrk="1" latinLnBrk="0" hangingPunct="1">
+              <a:lnSpc>
+                <a:spcPct val="90000"/>
+              </a:lnSpc>
+              <a:spcBef>
+                <a:spcPct val="0"/>
+              </a:spcBef>
+              <a:buNone/>
+              <a:defRPr sz="6000" kern="1200">
+                <a:solidFill>
+                  <a:schemeClr val="tx1"/>
+                </a:solidFill>
+                <a:latin typeface="+mj-lt"/>
+                <a:ea typeface="+mj-ea"/>
+                <a:cs typeface="+mj-cs"/>
+              </a:defRPr>
+            </a:lvl1pPr>
+          </a:lstStyle>
+          <a:p>
+            <a:pPr algn="l">
+              <a:lnSpc>
+                <a:spcPct val="120000"/>
+              </a:lnSpc>
+            </a:pPr>
+            <a:r>
+              <a:rPr lang="en-US" sz="2000" dirty="0" smtClean="0">
+                <a:solidFill>
+                  <a:schemeClr val="bg2">
+                    <a:lumMod val="75000"/>
+                  </a:schemeClr>
+                </a:solidFill>
+              </a:rPr>
+              <a:t> 	When to debug</a:t>
+            </a:r>
+            <a:endParaRPr lang="en-US" sz="2000" b="1" dirty="0" smtClean="0">
+              <a:solidFill>
+                <a:srgbClr val="E7E6E6">
+                  <a:lumMod val="50000"/>
+                </a:srgbClr>
+              </a:solidFill>
+            </a:endParaRPr>
+          </a:p>
+          <a:p>
+            <a:pPr algn="l">
+              <a:lnSpc>
+                <a:spcPct val="120000"/>
+              </a:lnSpc>
+            </a:pPr>
+            <a:r>
+              <a:rPr lang="en-US" sz="2000" b="1" dirty="0" smtClean="0">
+                <a:solidFill>
+                  <a:srgbClr val="E7E6E6">
+                    <a:lumMod val="50000"/>
+                  </a:srgbClr>
+                </a:solidFill>
+              </a:rPr>
+              <a:t>	How to debug (using </a:t>
+            </a:r>
+            <a:r>
+              <a:rPr lang="en-US" sz="2000" b="1" dirty="0" err="1" smtClean="0">
+                <a:solidFill>
+                  <a:srgbClr val="E7E6E6">
+                    <a:lumMod val="50000"/>
+                  </a:srgbClr>
+                </a:solidFill>
+              </a:rPr>
+              <a:t>vscode</a:t>
+            </a:r>
+            <a:r>
+              <a:rPr lang="en-US" sz="2000" b="1" dirty="0" smtClean="0">
+                <a:solidFill>
+                  <a:srgbClr val="E7E6E6">
+                    <a:lumMod val="50000"/>
+                  </a:srgbClr>
+                </a:solidFill>
+              </a:rPr>
+              <a:t>)</a:t>
+            </a:r>
+            <a:endParaRPr lang="en-US" sz="2000" b="1" dirty="0">
+              <a:solidFill>
+                <a:schemeClr val="bg2">
+                  <a:lumMod val="50000"/>
+                </a:schemeClr>
+              </a:solidFill>
+            </a:endParaRPr>
+          </a:p>
+        </p:txBody>
+      </p:sp>
+    </p:spTree>
+    <p:extLst>
+      <p:ext uri="{BB962C8B-B14F-4D97-AF65-F5344CB8AC3E}">
+        <p14:creationId xmlns:p14="http://schemas.microsoft.com/office/powerpoint/2010/main" val="734659843"/>
+      </p:ext>
+    </p:extLst>
+  </p:cSld>
+  <p:clrMapOvr>
+    <a:masterClrMapping/>
+  </p:clrMapOvr>
+  <p:timing>
+    <p:tnLst>
+      <p:par>
+        <p:cTn id="1" dur="indefinite" restart="never" nodeType="tmRoot"/>
+      </p:par>
+    </p:tnLst>
+  </p:timing>
 </p:sld>
 </file>
 

</xml_diff>